<commit_message>
All ppts and diagrams
</commit_message>
<xml_diff>
--- a/Diagrams/loop_mapping.pptx
+++ b/Diagrams/loop_mapping.pptx
@@ -2,18 +2,18 @@
 <file path=ppt/presentation.xml><?xml version="1.0" encoding="utf-8"?>
 <p:presentation xmlns:a="http://schemas.openxmlformats.org/drawingml/2006/main" xmlns:r="http://schemas.openxmlformats.org/officeDocument/2006/relationships" xmlns:p="http://schemas.openxmlformats.org/presentationml/2006/main" saveSubsetFonts="1">
   <p:sldMasterIdLst>
-    <p:sldMasterId id="2147483648" r:id="rId1"/>
+    <p:sldMasterId id="2147483684" r:id="rId1"/>
   </p:sldMasterIdLst>
   <p:sldIdLst>
     <p:sldId id="256" r:id="rId2"/>
   </p:sldIdLst>
-  <p:sldSz cx="12192000" cy="6858000"/>
+  <p:sldSz cx="12192000" cy="5029200"/>
   <p:notesSz cx="6858000" cy="9144000"/>
   <p:defaultTextStyle>
     <a:defPPr>
       <a:defRPr lang="en-US"/>
     </a:defPPr>
-    <a:lvl1pPr marL="0" algn="l" defTabSz="914400" rtl="0" eaLnBrk="1" latinLnBrk="0" hangingPunct="1">
+    <a:lvl1pPr marL="0" algn="l" defTabSz="457200" rtl="0" eaLnBrk="1" latinLnBrk="0" hangingPunct="1">
       <a:defRPr sz="1800" kern="1200">
         <a:solidFill>
           <a:schemeClr val="tx1"/>
@@ -23,7 +23,7 @@
         <a:cs typeface="+mn-cs"/>
       </a:defRPr>
     </a:lvl1pPr>
-    <a:lvl2pPr marL="457200" algn="l" defTabSz="914400" rtl="0" eaLnBrk="1" latinLnBrk="0" hangingPunct="1">
+    <a:lvl2pPr marL="457200" algn="l" defTabSz="457200" rtl="0" eaLnBrk="1" latinLnBrk="0" hangingPunct="1">
       <a:defRPr sz="1800" kern="1200">
         <a:solidFill>
           <a:schemeClr val="tx1"/>
@@ -33,7 +33,7 @@
         <a:cs typeface="+mn-cs"/>
       </a:defRPr>
     </a:lvl2pPr>
-    <a:lvl3pPr marL="914400" algn="l" defTabSz="914400" rtl="0" eaLnBrk="1" latinLnBrk="0" hangingPunct="1">
+    <a:lvl3pPr marL="914400" algn="l" defTabSz="457200" rtl="0" eaLnBrk="1" latinLnBrk="0" hangingPunct="1">
       <a:defRPr sz="1800" kern="1200">
         <a:solidFill>
           <a:schemeClr val="tx1"/>
@@ -43,7 +43,7 @@
         <a:cs typeface="+mn-cs"/>
       </a:defRPr>
     </a:lvl3pPr>
-    <a:lvl4pPr marL="1371600" algn="l" defTabSz="914400" rtl="0" eaLnBrk="1" latinLnBrk="0" hangingPunct="1">
+    <a:lvl4pPr marL="1371600" algn="l" defTabSz="457200" rtl="0" eaLnBrk="1" latinLnBrk="0" hangingPunct="1">
       <a:defRPr sz="1800" kern="1200">
         <a:solidFill>
           <a:schemeClr val="tx1"/>
@@ -53,7 +53,7 @@
         <a:cs typeface="+mn-cs"/>
       </a:defRPr>
     </a:lvl4pPr>
-    <a:lvl5pPr marL="1828800" algn="l" defTabSz="914400" rtl="0" eaLnBrk="1" latinLnBrk="0" hangingPunct="1">
+    <a:lvl5pPr marL="1828800" algn="l" defTabSz="457200" rtl="0" eaLnBrk="1" latinLnBrk="0" hangingPunct="1">
       <a:defRPr sz="1800" kern="1200">
         <a:solidFill>
           <a:schemeClr val="tx1"/>
@@ -63,7 +63,7 @@
         <a:cs typeface="+mn-cs"/>
       </a:defRPr>
     </a:lvl5pPr>
-    <a:lvl6pPr marL="2286000" algn="l" defTabSz="914400" rtl="0" eaLnBrk="1" latinLnBrk="0" hangingPunct="1">
+    <a:lvl6pPr marL="2286000" algn="l" defTabSz="457200" rtl="0" eaLnBrk="1" latinLnBrk="0" hangingPunct="1">
       <a:defRPr sz="1800" kern="1200">
         <a:solidFill>
           <a:schemeClr val="tx1"/>
@@ -73,7 +73,7 @@
         <a:cs typeface="+mn-cs"/>
       </a:defRPr>
     </a:lvl6pPr>
-    <a:lvl7pPr marL="2743200" algn="l" defTabSz="914400" rtl="0" eaLnBrk="1" latinLnBrk="0" hangingPunct="1">
+    <a:lvl7pPr marL="2743200" algn="l" defTabSz="457200" rtl="0" eaLnBrk="1" latinLnBrk="0" hangingPunct="1">
       <a:defRPr sz="1800" kern="1200">
         <a:solidFill>
           <a:schemeClr val="tx1"/>
@@ -83,7 +83,7 @@
         <a:cs typeface="+mn-cs"/>
       </a:defRPr>
     </a:lvl7pPr>
-    <a:lvl8pPr marL="3200400" algn="l" defTabSz="914400" rtl="0" eaLnBrk="1" latinLnBrk="0" hangingPunct="1">
+    <a:lvl8pPr marL="3200400" algn="l" defTabSz="457200" rtl="0" eaLnBrk="1" latinLnBrk="0" hangingPunct="1">
       <a:defRPr sz="1800" kern="1200">
         <a:solidFill>
           <a:schemeClr val="tx1"/>
@@ -93,7 +93,7 @@
         <a:cs typeface="+mn-cs"/>
       </a:defRPr>
     </a:lvl8pPr>
-    <a:lvl9pPr marL="3657600" algn="l" defTabSz="914400" rtl="0" eaLnBrk="1" latinLnBrk="0" hangingPunct="1">
+    <a:lvl9pPr marL="3657600" algn="l" defTabSz="457200" rtl="0" eaLnBrk="1" latinLnBrk="0" hangingPunct="1">
       <a:defRPr sz="1800" kern="1200">
         <a:solidFill>
           <a:schemeClr val="tx1"/>
@@ -110,6 +110,10 @@
     </p:ext>
   </p:extLst>
 </p:presentation>
+</file>
+
+<file path=ppt/revisionInfo.xml><?xml version="1.0" encoding="utf-8"?>
+<p1510:revInfo xmlns:a="http://schemas.openxmlformats.org/drawingml/2006/main" xmlns:r="http://schemas.openxmlformats.org/officeDocument/2006/relationships" xmlns:p1510="http://schemas.microsoft.com/office/powerpoint/2015/10/main"/>
 </file>
 
 <file path=ppt/slideLayouts/slideLayout1.xml><?xml version="1.0" encoding="utf-8"?>
@@ -141,23 +145,23 @@
         </p:nvSpPr>
         <p:spPr>
           <a:xfrm>
-            <a:off x="1524000" y="1122363"/>
-            <a:ext cx="9144000" cy="2387600"/>
+            <a:off x="1524000" y="823066"/>
+            <a:ext cx="9144000" cy="1750907"/>
           </a:xfrm>
         </p:spPr>
         <p:txBody>
           <a:bodyPr anchor="b"/>
           <a:lstStyle>
             <a:lvl1pPr algn="ctr">
-              <a:defRPr sz="6000"/>
+              <a:defRPr sz="4400"/>
             </a:lvl1pPr>
           </a:lstStyle>
           <a:p>
             <a:r>
-              <a:rPr lang="en-US" smtClean="0"/>
+              <a:rPr lang="en-US"/>
               <a:t>Click to edit Master title style</a:t>
             </a:r>
-            <a:endParaRPr lang="en-US"/>
+            <a:endParaRPr lang="en-US" dirty="0"/>
           </a:p>
         </p:txBody>
       </p:sp>
@@ -173,8 +177,8 @@
         </p:nvSpPr>
         <p:spPr>
           <a:xfrm>
-            <a:off x="1524000" y="3602038"/>
-            <a:ext cx="9144000" cy="1655762"/>
+            <a:off x="1524000" y="2641495"/>
+            <a:ext cx="9144000" cy="1214225"/>
           </a:xfrm>
         </p:spPr>
         <p:txBody>
@@ -182,47 +186,47 @@
           <a:lstStyle>
             <a:lvl1pPr marL="0" indent="0" algn="ctr">
               <a:buNone/>
-              <a:defRPr sz="2400"/>
+              <a:defRPr sz="1760"/>
             </a:lvl1pPr>
-            <a:lvl2pPr marL="457200" indent="0" algn="ctr">
+            <a:lvl2pPr marL="335265" indent="0" algn="ctr">
               <a:buNone/>
-              <a:defRPr sz="2000"/>
+              <a:defRPr sz="1467"/>
             </a:lvl2pPr>
-            <a:lvl3pPr marL="914400" indent="0" algn="ctr">
+            <a:lvl3pPr marL="670530" indent="0" algn="ctr">
               <a:buNone/>
-              <a:defRPr sz="1800"/>
+              <a:defRPr sz="1320"/>
             </a:lvl3pPr>
-            <a:lvl4pPr marL="1371600" indent="0" algn="ctr">
+            <a:lvl4pPr marL="1005794" indent="0" algn="ctr">
               <a:buNone/>
-              <a:defRPr sz="1600"/>
+              <a:defRPr sz="1173"/>
             </a:lvl4pPr>
-            <a:lvl5pPr marL="1828800" indent="0" algn="ctr">
+            <a:lvl5pPr marL="1341059" indent="0" algn="ctr">
               <a:buNone/>
-              <a:defRPr sz="1600"/>
+              <a:defRPr sz="1173"/>
             </a:lvl5pPr>
-            <a:lvl6pPr marL="2286000" indent="0" algn="ctr">
+            <a:lvl6pPr marL="1676324" indent="0" algn="ctr">
               <a:buNone/>
-              <a:defRPr sz="1600"/>
+              <a:defRPr sz="1173"/>
             </a:lvl6pPr>
-            <a:lvl7pPr marL="2743200" indent="0" algn="ctr">
+            <a:lvl7pPr marL="2011589" indent="0" algn="ctr">
               <a:buNone/>
-              <a:defRPr sz="1600"/>
+              <a:defRPr sz="1173"/>
             </a:lvl7pPr>
-            <a:lvl8pPr marL="3200400" indent="0" algn="ctr">
+            <a:lvl8pPr marL="2346853" indent="0" algn="ctr">
               <a:buNone/>
-              <a:defRPr sz="1600"/>
+              <a:defRPr sz="1173"/>
             </a:lvl8pPr>
-            <a:lvl9pPr marL="3657600" indent="0" algn="ctr">
+            <a:lvl9pPr marL="2682118" indent="0" algn="ctr">
               <a:buNone/>
-              <a:defRPr sz="1600"/>
+              <a:defRPr sz="1173"/>
             </a:lvl9pPr>
           </a:lstStyle>
           <a:p>
             <a:r>
-              <a:rPr lang="en-US" smtClean="0"/>
+              <a:rPr lang="en-US"/>
               <a:t>Click to edit Master subtitle style</a:t>
             </a:r>
-            <a:endParaRPr lang="en-US"/>
+            <a:endParaRPr lang="en-US" dirty="0"/>
           </a:p>
         </p:txBody>
       </p:sp>
@@ -243,7 +247,7 @@
           <a:p>
             <a:fld id="{670F4037-AF96-4A4B-AD90-5273BA30825A}" type="datetimeFigureOut">
               <a:rPr lang="en-US" smtClean="0"/>
-              <a:t>1/27/2017</a:t>
+              <a:t>11/9/2017</a:t>
             </a:fld>
             <a:endParaRPr lang="en-US"/>
           </a:p>
@@ -294,7 +298,7 @@
     </p:spTree>
     <p:extLst>
       <p:ext uri="{BB962C8B-B14F-4D97-AF65-F5344CB8AC3E}">
-        <p14:creationId xmlns:p14="http://schemas.microsoft.com/office/powerpoint/2010/main" val="1830382866"/>
+        <p14:creationId xmlns:p14="http://schemas.microsoft.com/office/powerpoint/2010/main" val="3734982841"/>
       </p:ext>
     </p:extLst>
   </p:cSld>
@@ -337,10 +341,10 @@
           <a:lstStyle/>
           <a:p>
             <a:r>
-              <a:rPr lang="en-US" smtClean="0"/>
+              <a:rPr lang="en-US"/>
               <a:t>Click to edit Master title style</a:t>
             </a:r>
-            <a:endParaRPr lang="en-US"/>
+            <a:endParaRPr lang="en-US" dirty="0"/>
           </a:p>
         </p:txBody>
       </p:sp>
@@ -361,38 +365,38 @@
           <a:p>
             <a:pPr lvl="0"/>
             <a:r>
-              <a:rPr lang="en-US" smtClean="0"/>
-              <a:t>Click to edit Master text styles</a:t>
+              <a:rPr lang="en-US"/>
+              <a:t>Edit Master text styles</a:t>
             </a:r>
           </a:p>
           <a:p>
             <a:pPr lvl="1"/>
             <a:r>
-              <a:rPr lang="en-US" smtClean="0"/>
+              <a:rPr lang="en-US"/>
               <a:t>Second level</a:t>
             </a:r>
           </a:p>
           <a:p>
             <a:pPr lvl="2"/>
             <a:r>
-              <a:rPr lang="en-US" smtClean="0"/>
+              <a:rPr lang="en-US"/>
               <a:t>Third level</a:t>
             </a:r>
           </a:p>
           <a:p>
             <a:pPr lvl="3"/>
             <a:r>
-              <a:rPr lang="en-US" smtClean="0"/>
+              <a:rPr lang="en-US"/>
               <a:t>Fourth level</a:t>
             </a:r>
           </a:p>
           <a:p>
             <a:pPr lvl="4"/>
             <a:r>
-              <a:rPr lang="en-US" smtClean="0"/>
+              <a:rPr lang="en-US"/>
               <a:t>Fifth level</a:t>
             </a:r>
-            <a:endParaRPr lang="en-US"/>
+            <a:endParaRPr lang="en-US" dirty="0"/>
           </a:p>
         </p:txBody>
       </p:sp>
@@ -413,7 +417,7 @@
           <a:p>
             <a:fld id="{670F4037-AF96-4A4B-AD90-5273BA30825A}" type="datetimeFigureOut">
               <a:rPr lang="en-US" smtClean="0"/>
-              <a:t>1/27/2017</a:t>
+              <a:t>11/9/2017</a:t>
             </a:fld>
             <a:endParaRPr lang="en-US"/>
           </a:p>
@@ -464,7 +468,7 @@
     </p:spTree>
     <p:extLst>
       <p:ext uri="{BB962C8B-B14F-4D97-AF65-F5344CB8AC3E}">
-        <p14:creationId xmlns:p14="http://schemas.microsoft.com/office/powerpoint/2010/main" val="2156609713"/>
+        <p14:creationId xmlns:p14="http://schemas.microsoft.com/office/powerpoint/2010/main" val="1212169613"/>
       </p:ext>
     </p:extLst>
   </p:cSld>
@@ -503,8 +507,8 @@
         </p:nvSpPr>
         <p:spPr>
           <a:xfrm>
-            <a:off x="8724900" y="365125"/>
-            <a:ext cx="2628900" cy="5811838"/>
+            <a:off x="8724900" y="267758"/>
+            <a:ext cx="2628900" cy="4262015"/>
           </a:xfrm>
         </p:spPr>
         <p:txBody>
@@ -512,10 +516,10 @@
           <a:lstStyle/>
           <a:p>
             <a:r>
-              <a:rPr lang="en-US" smtClean="0"/>
+              <a:rPr lang="en-US"/>
               <a:t>Click to edit Master title style</a:t>
             </a:r>
-            <a:endParaRPr lang="en-US"/>
+            <a:endParaRPr lang="en-US" dirty="0"/>
           </a:p>
         </p:txBody>
       </p:sp>
@@ -531,8 +535,8 @@
         </p:nvSpPr>
         <p:spPr>
           <a:xfrm>
-            <a:off x="838200" y="365125"/>
-            <a:ext cx="7734300" cy="5811838"/>
+            <a:off x="838200" y="267758"/>
+            <a:ext cx="7734300" cy="4262015"/>
           </a:xfrm>
         </p:spPr>
         <p:txBody>
@@ -541,38 +545,38 @@
           <a:p>
             <a:pPr lvl="0"/>
             <a:r>
-              <a:rPr lang="en-US" smtClean="0"/>
-              <a:t>Click to edit Master text styles</a:t>
+              <a:rPr lang="en-US"/>
+              <a:t>Edit Master text styles</a:t>
             </a:r>
           </a:p>
           <a:p>
             <a:pPr lvl="1"/>
             <a:r>
-              <a:rPr lang="en-US" smtClean="0"/>
+              <a:rPr lang="en-US"/>
               <a:t>Second level</a:t>
             </a:r>
           </a:p>
           <a:p>
             <a:pPr lvl="2"/>
             <a:r>
-              <a:rPr lang="en-US" smtClean="0"/>
+              <a:rPr lang="en-US"/>
               <a:t>Third level</a:t>
             </a:r>
           </a:p>
           <a:p>
             <a:pPr lvl="3"/>
             <a:r>
-              <a:rPr lang="en-US" smtClean="0"/>
+              <a:rPr lang="en-US"/>
               <a:t>Fourth level</a:t>
             </a:r>
           </a:p>
           <a:p>
             <a:pPr lvl="4"/>
             <a:r>
-              <a:rPr lang="en-US" smtClean="0"/>
+              <a:rPr lang="en-US"/>
               <a:t>Fifth level</a:t>
             </a:r>
-            <a:endParaRPr lang="en-US"/>
+            <a:endParaRPr lang="en-US" dirty="0"/>
           </a:p>
         </p:txBody>
       </p:sp>
@@ -593,7 +597,7 @@
           <a:p>
             <a:fld id="{670F4037-AF96-4A4B-AD90-5273BA30825A}" type="datetimeFigureOut">
               <a:rPr lang="en-US" smtClean="0"/>
-              <a:t>1/27/2017</a:t>
+              <a:t>11/9/2017</a:t>
             </a:fld>
             <a:endParaRPr lang="en-US"/>
           </a:p>
@@ -644,7 +648,7 @@
     </p:spTree>
     <p:extLst>
       <p:ext uri="{BB962C8B-B14F-4D97-AF65-F5344CB8AC3E}">
-        <p14:creationId xmlns:p14="http://schemas.microsoft.com/office/powerpoint/2010/main" val="4216871944"/>
+        <p14:creationId xmlns:p14="http://schemas.microsoft.com/office/powerpoint/2010/main" val="1368906691"/>
       </p:ext>
     </p:extLst>
   </p:cSld>
@@ -687,10 +691,10 @@
           <a:lstStyle/>
           <a:p>
             <a:r>
-              <a:rPr lang="en-US" smtClean="0"/>
+              <a:rPr lang="en-US"/>
               <a:t>Click to edit Master title style</a:t>
             </a:r>
-            <a:endParaRPr lang="en-US"/>
+            <a:endParaRPr lang="en-US" dirty="0"/>
           </a:p>
         </p:txBody>
       </p:sp>
@@ -711,38 +715,38 @@
           <a:p>
             <a:pPr lvl="0"/>
             <a:r>
-              <a:rPr lang="en-US" smtClean="0"/>
-              <a:t>Click to edit Master text styles</a:t>
+              <a:rPr lang="en-US"/>
+              <a:t>Edit Master text styles</a:t>
             </a:r>
           </a:p>
           <a:p>
             <a:pPr lvl="1"/>
             <a:r>
-              <a:rPr lang="en-US" smtClean="0"/>
+              <a:rPr lang="en-US"/>
               <a:t>Second level</a:t>
             </a:r>
           </a:p>
           <a:p>
             <a:pPr lvl="2"/>
             <a:r>
-              <a:rPr lang="en-US" smtClean="0"/>
+              <a:rPr lang="en-US"/>
               <a:t>Third level</a:t>
             </a:r>
           </a:p>
           <a:p>
             <a:pPr lvl="3"/>
             <a:r>
-              <a:rPr lang="en-US" smtClean="0"/>
+              <a:rPr lang="en-US"/>
               <a:t>Fourth level</a:t>
             </a:r>
           </a:p>
           <a:p>
             <a:pPr lvl="4"/>
             <a:r>
-              <a:rPr lang="en-US" smtClean="0"/>
+              <a:rPr lang="en-US"/>
               <a:t>Fifth level</a:t>
             </a:r>
-            <a:endParaRPr lang="en-US"/>
+            <a:endParaRPr lang="en-US" dirty="0"/>
           </a:p>
         </p:txBody>
       </p:sp>
@@ -763,7 +767,7 @@
           <a:p>
             <a:fld id="{670F4037-AF96-4A4B-AD90-5273BA30825A}" type="datetimeFigureOut">
               <a:rPr lang="en-US" smtClean="0"/>
-              <a:t>1/27/2017</a:t>
+              <a:t>11/9/2017</a:t>
             </a:fld>
             <a:endParaRPr lang="en-US"/>
           </a:p>
@@ -814,7 +818,7 @@
     </p:spTree>
     <p:extLst>
       <p:ext uri="{BB962C8B-B14F-4D97-AF65-F5344CB8AC3E}">
-        <p14:creationId xmlns:p14="http://schemas.microsoft.com/office/powerpoint/2010/main" val="2964892475"/>
+        <p14:creationId xmlns:p14="http://schemas.microsoft.com/office/powerpoint/2010/main" val="3846838737"/>
       </p:ext>
     </p:extLst>
   </p:cSld>
@@ -853,23 +857,23 @@
         </p:nvSpPr>
         <p:spPr>
           <a:xfrm>
-            <a:off x="831850" y="1709738"/>
-            <a:ext cx="10515600" cy="2852737"/>
+            <a:off x="831850" y="1253808"/>
+            <a:ext cx="10515600" cy="2092007"/>
           </a:xfrm>
         </p:spPr>
         <p:txBody>
           <a:bodyPr anchor="b"/>
           <a:lstStyle>
             <a:lvl1pPr>
-              <a:defRPr sz="6000"/>
+              <a:defRPr sz="4400"/>
             </a:lvl1pPr>
           </a:lstStyle>
           <a:p>
             <a:r>
-              <a:rPr lang="en-US" smtClean="0"/>
+              <a:rPr lang="en-US"/>
               <a:t>Click to edit Master title style</a:t>
             </a:r>
-            <a:endParaRPr lang="en-US"/>
+            <a:endParaRPr lang="en-US" dirty="0"/>
           </a:p>
         </p:txBody>
       </p:sp>
@@ -885,8 +889,8 @@
         </p:nvSpPr>
         <p:spPr>
           <a:xfrm>
-            <a:off x="831850" y="4589463"/>
-            <a:ext cx="10515600" cy="1500187"/>
+            <a:off x="831850" y="3365607"/>
+            <a:ext cx="10515600" cy="1100137"/>
           </a:xfrm>
         </p:spPr>
         <p:txBody>
@@ -894,7 +898,7 @@
           <a:lstStyle>
             <a:lvl1pPr marL="0" indent="0">
               <a:buNone/>
-              <a:defRPr sz="2400">
+              <a:defRPr sz="1760">
                 <a:solidFill>
                   <a:schemeClr val="tx1">
                     <a:tint val="75000"/>
@@ -902,9 +906,9 @@
                 </a:solidFill>
               </a:defRPr>
             </a:lvl1pPr>
-            <a:lvl2pPr marL="457200" indent="0">
+            <a:lvl2pPr marL="335265" indent="0">
               <a:buNone/>
-              <a:defRPr sz="2000">
+              <a:defRPr sz="1467">
                 <a:solidFill>
                   <a:schemeClr val="tx1">
                     <a:tint val="75000"/>
@@ -912,9 +916,9 @@
                 </a:solidFill>
               </a:defRPr>
             </a:lvl2pPr>
-            <a:lvl3pPr marL="914400" indent="0">
+            <a:lvl3pPr marL="670530" indent="0">
               <a:buNone/>
-              <a:defRPr sz="1800">
+              <a:defRPr sz="1320">
                 <a:solidFill>
                   <a:schemeClr val="tx1">
                     <a:tint val="75000"/>
@@ -922,9 +926,9 @@
                 </a:solidFill>
               </a:defRPr>
             </a:lvl3pPr>
-            <a:lvl4pPr marL="1371600" indent="0">
+            <a:lvl4pPr marL="1005794" indent="0">
               <a:buNone/>
-              <a:defRPr sz="1600">
+              <a:defRPr sz="1173">
                 <a:solidFill>
                   <a:schemeClr val="tx1">
                     <a:tint val="75000"/>
@@ -932,9 +936,9 @@
                 </a:solidFill>
               </a:defRPr>
             </a:lvl4pPr>
-            <a:lvl5pPr marL="1828800" indent="0">
+            <a:lvl5pPr marL="1341059" indent="0">
               <a:buNone/>
-              <a:defRPr sz="1600">
+              <a:defRPr sz="1173">
                 <a:solidFill>
                   <a:schemeClr val="tx1">
                     <a:tint val="75000"/>
@@ -942,9 +946,9 @@
                 </a:solidFill>
               </a:defRPr>
             </a:lvl5pPr>
-            <a:lvl6pPr marL="2286000" indent="0">
+            <a:lvl6pPr marL="1676324" indent="0">
               <a:buNone/>
-              <a:defRPr sz="1600">
+              <a:defRPr sz="1173">
                 <a:solidFill>
                   <a:schemeClr val="tx1">
                     <a:tint val="75000"/>
@@ -952,9 +956,9 @@
                 </a:solidFill>
               </a:defRPr>
             </a:lvl6pPr>
-            <a:lvl7pPr marL="2743200" indent="0">
+            <a:lvl7pPr marL="2011589" indent="0">
               <a:buNone/>
-              <a:defRPr sz="1600">
+              <a:defRPr sz="1173">
                 <a:solidFill>
                   <a:schemeClr val="tx1">
                     <a:tint val="75000"/>
@@ -962,9 +966,9 @@
                 </a:solidFill>
               </a:defRPr>
             </a:lvl7pPr>
-            <a:lvl8pPr marL="3200400" indent="0">
+            <a:lvl8pPr marL="2346853" indent="0">
               <a:buNone/>
-              <a:defRPr sz="1600">
+              <a:defRPr sz="1173">
                 <a:solidFill>
                   <a:schemeClr val="tx1">
                     <a:tint val="75000"/>
@@ -972,9 +976,9 @@
                 </a:solidFill>
               </a:defRPr>
             </a:lvl8pPr>
-            <a:lvl9pPr marL="3657600" indent="0">
+            <a:lvl9pPr marL="2682118" indent="0">
               <a:buNone/>
-              <a:defRPr sz="1600">
+              <a:defRPr sz="1173">
                 <a:solidFill>
                   <a:schemeClr val="tx1">
                     <a:tint val="75000"/>
@@ -986,8 +990,8 @@
           <a:p>
             <a:pPr lvl="0"/>
             <a:r>
-              <a:rPr lang="en-US" smtClean="0"/>
-              <a:t>Click to edit Master text styles</a:t>
+              <a:rPr lang="en-US"/>
+              <a:t>Edit Master text styles</a:t>
             </a:r>
           </a:p>
         </p:txBody>
@@ -1009,7 +1013,7 @@
           <a:p>
             <a:fld id="{670F4037-AF96-4A4B-AD90-5273BA30825A}" type="datetimeFigureOut">
               <a:rPr lang="en-US" smtClean="0"/>
-              <a:t>1/27/2017</a:t>
+              <a:t>11/9/2017</a:t>
             </a:fld>
             <a:endParaRPr lang="en-US"/>
           </a:p>
@@ -1060,7 +1064,7 @@
     </p:spTree>
     <p:extLst>
       <p:ext uri="{BB962C8B-B14F-4D97-AF65-F5344CB8AC3E}">
-        <p14:creationId xmlns:p14="http://schemas.microsoft.com/office/powerpoint/2010/main" val="3783683497"/>
+        <p14:creationId xmlns:p14="http://schemas.microsoft.com/office/powerpoint/2010/main" val="1528976665"/>
       </p:ext>
     </p:extLst>
   </p:cSld>
@@ -1103,10 +1107,10 @@
           <a:lstStyle/>
           <a:p>
             <a:r>
-              <a:rPr lang="en-US" smtClean="0"/>
+              <a:rPr lang="en-US"/>
               <a:t>Click to edit Master title style</a:t>
             </a:r>
-            <a:endParaRPr lang="en-US"/>
+            <a:endParaRPr lang="en-US" dirty="0"/>
           </a:p>
         </p:txBody>
       </p:sp>
@@ -1122,8 +1126,8 @@
         </p:nvSpPr>
         <p:spPr>
           <a:xfrm>
-            <a:off x="838200" y="1825625"/>
-            <a:ext cx="5181600" cy="4351338"/>
+            <a:off x="838200" y="1338792"/>
+            <a:ext cx="5181600" cy="3190981"/>
           </a:xfrm>
         </p:spPr>
         <p:txBody>
@@ -1132,38 +1136,38 @@
           <a:p>
             <a:pPr lvl="0"/>
             <a:r>
-              <a:rPr lang="en-US" smtClean="0"/>
-              <a:t>Click to edit Master text styles</a:t>
+              <a:rPr lang="en-US"/>
+              <a:t>Edit Master text styles</a:t>
             </a:r>
           </a:p>
           <a:p>
             <a:pPr lvl="1"/>
             <a:r>
-              <a:rPr lang="en-US" smtClean="0"/>
+              <a:rPr lang="en-US"/>
               <a:t>Second level</a:t>
             </a:r>
           </a:p>
           <a:p>
             <a:pPr lvl="2"/>
             <a:r>
-              <a:rPr lang="en-US" smtClean="0"/>
+              <a:rPr lang="en-US"/>
               <a:t>Third level</a:t>
             </a:r>
           </a:p>
           <a:p>
             <a:pPr lvl="3"/>
             <a:r>
-              <a:rPr lang="en-US" smtClean="0"/>
+              <a:rPr lang="en-US"/>
               <a:t>Fourth level</a:t>
             </a:r>
           </a:p>
           <a:p>
             <a:pPr lvl="4"/>
             <a:r>
-              <a:rPr lang="en-US" smtClean="0"/>
+              <a:rPr lang="en-US"/>
               <a:t>Fifth level</a:t>
             </a:r>
-            <a:endParaRPr lang="en-US"/>
+            <a:endParaRPr lang="en-US" dirty="0"/>
           </a:p>
         </p:txBody>
       </p:sp>
@@ -1179,8 +1183,8 @@
         </p:nvSpPr>
         <p:spPr>
           <a:xfrm>
-            <a:off x="6172200" y="1825625"/>
-            <a:ext cx="5181600" cy="4351338"/>
+            <a:off x="6172200" y="1338792"/>
+            <a:ext cx="5181600" cy="3190981"/>
           </a:xfrm>
         </p:spPr>
         <p:txBody>
@@ -1189,38 +1193,38 @@
           <a:p>
             <a:pPr lvl="0"/>
             <a:r>
-              <a:rPr lang="en-US" smtClean="0"/>
-              <a:t>Click to edit Master text styles</a:t>
+              <a:rPr lang="en-US"/>
+              <a:t>Edit Master text styles</a:t>
             </a:r>
           </a:p>
           <a:p>
             <a:pPr lvl="1"/>
             <a:r>
-              <a:rPr lang="en-US" smtClean="0"/>
+              <a:rPr lang="en-US"/>
               <a:t>Second level</a:t>
             </a:r>
           </a:p>
           <a:p>
             <a:pPr lvl="2"/>
             <a:r>
-              <a:rPr lang="en-US" smtClean="0"/>
+              <a:rPr lang="en-US"/>
               <a:t>Third level</a:t>
             </a:r>
           </a:p>
           <a:p>
             <a:pPr lvl="3"/>
             <a:r>
-              <a:rPr lang="en-US" smtClean="0"/>
+              <a:rPr lang="en-US"/>
               <a:t>Fourth level</a:t>
             </a:r>
           </a:p>
           <a:p>
             <a:pPr lvl="4"/>
             <a:r>
-              <a:rPr lang="en-US" smtClean="0"/>
+              <a:rPr lang="en-US"/>
               <a:t>Fifth level</a:t>
             </a:r>
-            <a:endParaRPr lang="en-US"/>
+            <a:endParaRPr lang="en-US" dirty="0"/>
           </a:p>
         </p:txBody>
       </p:sp>
@@ -1241,7 +1245,7 @@
           <a:p>
             <a:fld id="{670F4037-AF96-4A4B-AD90-5273BA30825A}" type="datetimeFigureOut">
               <a:rPr lang="en-US" smtClean="0"/>
-              <a:t>1/27/2017</a:t>
+              <a:t>11/9/2017</a:t>
             </a:fld>
             <a:endParaRPr lang="en-US"/>
           </a:p>
@@ -1292,7 +1296,7 @@
     </p:spTree>
     <p:extLst>
       <p:ext uri="{BB962C8B-B14F-4D97-AF65-F5344CB8AC3E}">
-        <p14:creationId xmlns:p14="http://schemas.microsoft.com/office/powerpoint/2010/main" val="1237541420"/>
+        <p14:creationId xmlns:p14="http://schemas.microsoft.com/office/powerpoint/2010/main" val="265203416"/>
       </p:ext>
     </p:extLst>
   </p:cSld>
@@ -1331,8 +1335,8 @@
         </p:nvSpPr>
         <p:spPr>
           <a:xfrm>
-            <a:off x="839788" y="365125"/>
-            <a:ext cx="10515600" cy="1325563"/>
+            <a:off x="839788" y="267758"/>
+            <a:ext cx="10515600" cy="972080"/>
           </a:xfrm>
         </p:spPr>
         <p:txBody>
@@ -1340,10 +1344,10 @@
           <a:lstStyle/>
           <a:p>
             <a:r>
-              <a:rPr lang="en-US" smtClean="0"/>
+              <a:rPr lang="en-US"/>
               <a:t>Click to edit Master title style</a:t>
             </a:r>
-            <a:endParaRPr lang="en-US"/>
+            <a:endParaRPr lang="en-US" dirty="0"/>
           </a:p>
         </p:txBody>
       </p:sp>
@@ -1359,8 +1363,8 @@
         </p:nvSpPr>
         <p:spPr>
           <a:xfrm>
-            <a:off x="839788" y="1681163"/>
-            <a:ext cx="5157787" cy="823912"/>
+            <a:off x="839789" y="1232853"/>
+            <a:ext cx="5157787" cy="604202"/>
           </a:xfrm>
         </p:spPr>
         <p:txBody>
@@ -1368,46 +1372,46 @@
           <a:lstStyle>
             <a:lvl1pPr marL="0" indent="0">
               <a:buNone/>
-              <a:defRPr sz="2400" b="1"/>
+              <a:defRPr sz="1760" b="1"/>
             </a:lvl1pPr>
-            <a:lvl2pPr marL="457200" indent="0">
+            <a:lvl2pPr marL="335265" indent="0">
               <a:buNone/>
-              <a:defRPr sz="2000" b="1"/>
+              <a:defRPr sz="1467" b="1"/>
             </a:lvl2pPr>
-            <a:lvl3pPr marL="914400" indent="0">
+            <a:lvl3pPr marL="670530" indent="0">
               <a:buNone/>
-              <a:defRPr sz="1800" b="1"/>
+              <a:defRPr sz="1320" b="1"/>
             </a:lvl3pPr>
-            <a:lvl4pPr marL="1371600" indent="0">
+            <a:lvl4pPr marL="1005794" indent="0">
               <a:buNone/>
-              <a:defRPr sz="1600" b="1"/>
+              <a:defRPr sz="1173" b="1"/>
             </a:lvl4pPr>
-            <a:lvl5pPr marL="1828800" indent="0">
+            <a:lvl5pPr marL="1341059" indent="0">
               <a:buNone/>
-              <a:defRPr sz="1600" b="1"/>
+              <a:defRPr sz="1173" b="1"/>
             </a:lvl5pPr>
-            <a:lvl6pPr marL="2286000" indent="0">
+            <a:lvl6pPr marL="1676324" indent="0">
               <a:buNone/>
-              <a:defRPr sz="1600" b="1"/>
+              <a:defRPr sz="1173" b="1"/>
             </a:lvl6pPr>
-            <a:lvl7pPr marL="2743200" indent="0">
+            <a:lvl7pPr marL="2011589" indent="0">
               <a:buNone/>
-              <a:defRPr sz="1600" b="1"/>
+              <a:defRPr sz="1173" b="1"/>
             </a:lvl7pPr>
-            <a:lvl8pPr marL="3200400" indent="0">
+            <a:lvl8pPr marL="2346853" indent="0">
               <a:buNone/>
-              <a:defRPr sz="1600" b="1"/>
+              <a:defRPr sz="1173" b="1"/>
             </a:lvl8pPr>
-            <a:lvl9pPr marL="3657600" indent="0">
+            <a:lvl9pPr marL="2682118" indent="0">
               <a:buNone/>
-              <a:defRPr sz="1600" b="1"/>
+              <a:defRPr sz="1173" b="1"/>
             </a:lvl9pPr>
           </a:lstStyle>
           <a:p>
             <a:pPr lvl="0"/>
             <a:r>
-              <a:rPr lang="en-US" smtClean="0"/>
-              <a:t>Click to edit Master text styles</a:t>
+              <a:rPr lang="en-US"/>
+              <a:t>Edit Master text styles</a:t>
             </a:r>
           </a:p>
         </p:txBody>
@@ -1424,8 +1428,8 @@
         </p:nvSpPr>
         <p:spPr>
           <a:xfrm>
-            <a:off x="839788" y="2505075"/>
-            <a:ext cx="5157787" cy="3684588"/>
+            <a:off x="839789" y="1837055"/>
+            <a:ext cx="5157787" cy="2702031"/>
           </a:xfrm>
         </p:spPr>
         <p:txBody>
@@ -1434,38 +1438,38 @@
           <a:p>
             <a:pPr lvl="0"/>
             <a:r>
-              <a:rPr lang="en-US" smtClean="0"/>
-              <a:t>Click to edit Master text styles</a:t>
+              <a:rPr lang="en-US"/>
+              <a:t>Edit Master text styles</a:t>
             </a:r>
           </a:p>
           <a:p>
             <a:pPr lvl="1"/>
             <a:r>
-              <a:rPr lang="en-US" smtClean="0"/>
+              <a:rPr lang="en-US"/>
               <a:t>Second level</a:t>
             </a:r>
           </a:p>
           <a:p>
             <a:pPr lvl="2"/>
             <a:r>
-              <a:rPr lang="en-US" smtClean="0"/>
+              <a:rPr lang="en-US"/>
               <a:t>Third level</a:t>
             </a:r>
           </a:p>
           <a:p>
             <a:pPr lvl="3"/>
             <a:r>
-              <a:rPr lang="en-US" smtClean="0"/>
+              <a:rPr lang="en-US"/>
               <a:t>Fourth level</a:t>
             </a:r>
           </a:p>
           <a:p>
             <a:pPr lvl="4"/>
             <a:r>
-              <a:rPr lang="en-US" smtClean="0"/>
+              <a:rPr lang="en-US"/>
               <a:t>Fifth level</a:t>
             </a:r>
-            <a:endParaRPr lang="en-US"/>
+            <a:endParaRPr lang="en-US" dirty="0"/>
           </a:p>
         </p:txBody>
       </p:sp>
@@ -1481,8 +1485,8 @@
         </p:nvSpPr>
         <p:spPr>
           <a:xfrm>
-            <a:off x="6172200" y="1681163"/>
-            <a:ext cx="5183188" cy="823912"/>
+            <a:off x="6172200" y="1232853"/>
+            <a:ext cx="5183188" cy="604202"/>
           </a:xfrm>
         </p:spPr>
         <p:txBody>
@@ -1490,46 +1494,46 @@
           <a:lstStyle>
             <a:lvl1pPr marL="0" indent="0">
               <a:buNone/>
-              <a:defRPr sz="2400" b="1"/>
+              <a:defRPr sz="1760" b="1"/>
             </a:lvl1pPr>
-            <a:lvl2pPr marL="457200" indent="0">
+            <a:lvl2pPr marL="335265" indent="0">
               <a:buNone/>
-              <a:defRPr sz="2000" b="1"/>
+              <a:defRPr sz="1467" b="1"/>
             </a:lvl2pPr>
-            <a:lvl3pPr marL="914400" indent="0">
+            <a:lvl3pPr marL="670530" indent="0">
               <a:buNone/>
-              <a:defRPr sz="1800" b="1"/>
+              <a:defRPr sz="1320" b="1"/>
             </a:lvl3pPr>
-            <a:lvl4pPr marL="1371600" indent="0">
+            <a:lvl4pPr marL="1005794" indent="0">
               <a:buNone/>
-              <a:defRPr sz="1600" b="1"/>
+              <a:defRPr sz="1173" b="1"/>
             </a:lvl4pPr>
-            <a:lvl5pPr marL="1828800" indent="0">
+            <a:lvl5pPr marL="1341059" indent="0">
               <a:buNone/>
-              <a:defRPr sz="1600" b="1"/>
+              <a:defRPr sz="1173" b="1"/>
             </a:lvl5pPr>
-            <a:lvl6pPr marL="2286000" indent="0">
+            <a:lvl6pPr marL="1676324" indent="0">
               <a:buNone/>
-              <a:defRPr sz="1600" b="1"/>
+              <a:defRPr sz="1173" b="1"/>
             </a:lvl6pPr>
-            <a:lvl7pPr marL="2743200" indent="0">
+            <a:lvl7pPr marL="2011589" indent="0">
               <a:buNone/>
-              <a:defRPr sz="1600" b="1"/>
+              <a:defRPr sz="1173" b="1"/>
             </a:lvl7pPr>
-            <a:lvl8pPr marL="3200400" indent="0">
+            <a:lvl8pPr marL="2346853" indent="0">
               <a:buNone/>
-              <a:defRPr sz="1600" b="1"/>
+              <a:defRPr sz="1173" b="1"/>
             </a:lvl8pPr>
-            <a:lvl9pPr marL="3657600" indent="0">
+            <a:lvl9pPr marL="2682118" indent="0">
               <a:buNone/>
-              <a:defRPr sz="1600" b="1"/>
+              <a:defRPr sz="1173" b="1"/>
             </a:lvl9pPr>
           </a:lstStyle>
           <a:p>
             <a:pPr lvl="0"/>
             <a:r>
-              <a:rPr lang="en-US" smtClean="0"/>
-              <a:t>Click to edit Master text styles</a:t>
+              <a:rPr lang="en-US"/>
+              <a:t>Edit Master text styles</a:t>
             </a:r>
           </a:p>
         </p:txBody>
@@ -1546,8 +1550,8 @@
         </p:nvSpPr>
         <p:spPr>
           <a:xfrm>
-            <a:off x="6172200" y="2505075"/>
-            <a:ext cx="5183188" cy="3684588"/>
+            <a:off x="6172200" y="1837055"/>
+            <a:ext cx="5183188" cy="2702031"/>
           </a:xfrm>
         </p:spPr>
         <p:txBody>
@@ -1556,38 +1560,38 @@
           <a:p>
             <a:pPr lvl="0"/>
             <a:r>
-              <a:rPr lang="en-US" smtClean="0"/>
-              <a:t>Click to edit Master text styles</a:t>
+              <a:rPr lang="en-US"/>
+              <a:t>Edit Master text styles</a:t>
             </a:r>
           </a:p>
           <a:p>
             <a:pPr lvl="1"/>
             <a:r>
-              <a:rPr lang="en-US" smtClean="0"/>
+              <a:rPr lang="en-US"/>
               <a:t>Second level</a:t>
             </a:r>
           </a:p>
           <a:p>
             <a:pPr lvl="2"/>
             <a:r>
-              <a:rPr lang="en-US" smtClean="0"/>
+              <a:rPr lang="en-US"/>
               <a:t>Third level</a:t>
             </a:r>
           </a:p>
           <a:p>
             <a:pPr lvl="3"/>
             <a:r>
-              <a:rPr lang="en-US" smtClean="0"/>
+              <a:rPr lang="en-US"/>
               <a:t>Fourth level</a:t>
             </a:r>
           </a:p>
           <a:p>
             <a:pPr lvl="4"/>
             <a:r>
-              <a:rPr lang="en-US" smtClean="0"/>
+              <a:rPr lang="en-US"/>
               <a:t>Fifth level</a:t>
             </a:r>
-            <a:endParaRPr lang="en-US"/>
+            <a:endParaRPr lang="en-US" dirty="0"/>
           </a:p>
         </p:txBody>
       </p:sp>
@@ -1608,7 +1612,7 @@
           <a:p>
             <a:fld id="{670F4037-AF96-4A4B-AD90-5273BA30825A}" type="datetimeFigureOut">
               <a:rPr lang="en-US" smtClean="0"/>
-              <a:t>1/27/2017</a:t>
+              <a:t>11/9/2017</a:t>
             </a:fld>
             <a:endParaRPr lang="en-US"/>
           </a:p>
@@ -1659,7 +1663,7 @@
     </p:spTree>
     <p:extLst>
       <p:ext uri="{BB962C8B-B14F-4D97-AF65-F5344CB8AC3E}">
-        <p14:creationId xmlns:p14="http://schemas.microsoft.com/office/powerpoint/2010/main" val="2295623787"/>
+        <p14:creationId xmlns:p14="http://schemas.microsoft.com/office/powerpoint/2010/main" val="1216465328"/>
       </p:ext>
     </p:extLst>
   </p:cSld>
@@ -1702,10 +1706,10 @@
           <a:lstStyle/>
           <a:p>
             <a:r>
-              <a:rPr lang="en-US" smtClean="0"/>
+              <a:rPr lang="en-US"/>
               <a:t>Click to edit Master title style</a:t>
             </a:r>
-            <a:endParaRPr lang="en-US"/>
+            <a:endParaRPr lang="en-US" dirty="0"/>
           </a:p>
         </p:txBody>
       </p:sp>
@@ -1726,7 +1730,7 @@
           <a:p>
             <a:fld id="{670F4037-AF96-4A4B-AD90-5273BA30825A}" type="datetimeFigureOut">
               <a:rPr lang="en-US" smtClean="0"/>
-              <a:t>1/27/2017</a:t>
+              <a:t>11/9/2017</a:t>
             </a:fld>
             <a:endParaRPr lang="en-US"/>
           </a:p>
@@ -1777,7 +1781,7 @@
     </p:spTree>
     <p:extLst>
       <p:ext uri="{BB962C8B-B14F-4D97-AF65-F5344CB8AC3E}">
-        <p14:creationId xmlns:p14="http://schemas.microsoft.com/office/powerpoint/2010/main" val="3999543404"/>
+        <p14:creationId xmlns:p14="http://schemas.microsoft.com/office/powerpoint/2010/main" val="3802175798"/>
       </p:ext>
     </p:extLst>
   </p:cSld>
@@ -1821,7 +1825,7 @@
           <a:p>
             <a:fld id="{670F4037-AF96-4A4B-AD90-5273BA30825A}" type="datetimeFigureOut">
               <a:rPr lang="en-US" smtClean="0"/>
-              <a:t>1/27/2017</a:t>
+              <a:t>11/9/2017</a:t>
             </a:fld>
             <a:endParaRPr lang="en-US"/>
           </a:p>
@@ -1872,7 +1876,7 @@
     </p:spTree>
     <p:extLst>
       <p:ext uri="{BB962C8B-B14F-4D97-AF65-F5344CB8AC3E}">
-        <p14:creationId xmlns:p14="http://schemas.microsoft.com/office/powerpoint/2010/main" val="3917788910"/>
+        <p14:creationId xmlns:p14="http://schemas.microsoft.com/office/powerpoint/2010/main" val="530525393"/>
       </p:ext>
     </p:extLst>
   </p:cSld>
@@ -1911,23 +1915,23 @@
         </p:nvSpPr>
         <p:spPr>
           <a:xfrm>
-            <a:off x="839788" y="457200"/>
-            <a:ext cx="3932237" cy="1600200"/>
+            <a:off x="839789" y="335280"/>
+            <a:ext cx="3932237" cy="1173480"/>
           </a:xfrm>
         </p:spPr>
         <p:txBody>
           <a:bodyPr anchor="b"/>
           <a:lstStyle>
             <a:lvl1pPr>
-              <a:defRPr sz="3200"/>
+              <a:defRPr sz="2347"/>
             </a:lvl1pPr>
           </a:lstStyle>
           <a:p>
             <a:r>
-              <a:rPr lang="en-US" smtClean="0"/>
+              <a:rPr lang="en-US"/>
               <a:t>Click to edit Master title style</a:t>
             </a:r>
-            <a:endParaRPr lang="en-US"/>
+            <a:endParaRPr lang="en-US" dirty="0"/>
           </a:p>
         </p:txBody>
       </p:sp>
@@ -1943,76 +1947,76 @@
         </p:nvSpPr>
         <p:spPr>
           <a:xfrm>
-            <a:off x="5183188" y="987425"/>
-            <a:ext cx="6172200" cy="4873625"/>
+            <a:off x="5183188" y="724112"/>
+            <a:ext cx="6172200" cy="3573992"/>
           </a:xfrm>
         </p:spPr>
         <p:txBody>
           <a:bodyPr/>
           <a:lstStyle>
             <a:lvl1pPr>
-              <a:defRPr sz="3200"/>
+              <a:defRPr sz="2347"/>
             </a:lvl1pPr>
             <a:lvl2pPr>
-              <a:defRPr sz="2800"/>
+              <a:defRPr sz="2053"/>
             </a:lvl2pPr>
             <a:lvl3pPr>
-              <a:defRPr sz="2400"/>
+              <a:defRPr sz="1760"/>
             </a:lvl3pPr>
             <a:lvl4pPr>
-              <a:defRPr sz="2000"/>
+              <a:defRPr sz="1467"/>
             </a:lvl4pPr>
             <a:lvl5pPr>
-              <a:defRPr sz="2000"/>
+              <a:defRPr sz="1467"/>
             </a:lvl5pPr>
             <a:lvl6pPr>
-              <a:defRPr sz="2000"/>
+              <a:defRPr sz="1467"/>
             </a:lvl6pPr>
             <a:lvl7pPr>
-              <a:defRPr sz="2000"/>
+              <a:defRPr sz="1467"/>
             </a:lvl7pPr>
             <a:lvl8pPr>
-              <a:defRPr sz="2000"/>
+              <a:defRPr sz="1467"/>
             </a:lvl8pPr>
             <a:lvl9pPr>
-              <a:defRPr sz="2000"/>
+              <a:defRPr sz="1467"/>
             </a:lvl9pPr>
           </a:lstStyle>
           <a:p>
             <a:pPr lvl="0"/>
             <a:r>
-              <a:rPr lang="en-US" smtClean="0"/>
-              <a:t>Click to edit Master text styles</a:t>
+              <a:rPr lang="en-US"/>
+              <a:t>Edit Master text styles</a:t>
             </a:r>
           </a:p>
           <a:p>
             <a:pPr lvl="1"/>
             <a:r>
-              <a:rPr lang="en-US" smtClean="0"/>
+              <a:rPr lang="en-US"/>
               <a:t>Second level</a:t>
             </a:r>
           </a:p>
           <a:p>
             <a:pPr lvl="2"/>
             <a:r>
-              <a:rPr lang="en-US" smtClean="0"/>
+              <a:rPr lang="en-US"/>
               <a:t>Third level</a:t>
             </a:r>
           </a:p>
           <a:p>
             <a:pPr lvl="3"/>
             <a:r>
-              <a:rPr lang="en-US" smtClean="0"/>
+              <a:rPr lang="en-US"/>
               <a:t>Fourth level</a:t>
             </a:r>
           </a:p>
           <a:p>
             <a:pPr lvl="4"/>
             <a:r>
-              <a:rPr lang="en-US" smtClean="0"/>
+              <a:rPr lang="en-US"/>
               <a:t>Fifth level</a:t>
             </a:r>
-            <a:endParaRPr lang="en-US"/>
+            <a:endParaRPr lang="en-US" dirty="0"/>
           </a:p>
         </p:txBody>
       </p:sp>
@@ -2028,8 +2032,8 @@
         </p:nvSpPr>
         <p:spPr>
           <a:xfrm>
-            <a:off x="839788" y="2057400"/>
-            <a:ext cx="3932237" cy="3811588"/>
+            <a:off x="839789" y="1508760"/>
+            <a:ext cx="3932237" cy="2795165"/>
           </a:xfrm>
         </p:spPr>
         <p:txBody>
@@ -2037,46 +2041,46 @@
           <a:lstStyle>
             <a:lvl1pPr marL="0" indent="0">
               <a:buNone/>
-              <a:defRPr sz="1600"/>
+              <a:defRPr sz="1173"/>
             </a:lvl1pPr>
-            <a:lvl2pPr marL="457200" indent="0">
+            <a:lvl2pPr marL="335265" indent="0">
               <a:buNone/>
-              <a:defRPr sz="1400"/>
+              <a:defRPr sz="1027"/>
             </a:lvl2pPr>
-            <a:lvl3pPr marL="914400" indent="0">
+            <a:lvl3pPr marL="670530" indent="0">
               <a:buNone/>
-              <a:defRPr sz="1200"/>
+              <a:defRPr sz="880"/>
             </a:lvl3pPr>
-            <a:lvl4pPr marL="1371600" indent="0">
+            <a:lvl4pPr marL="1005794" indent="0">
               <a:buNone/>
-              <a:defRPr sz="1000"/>
+              <a:defRPr sz="733"/>
             </a:lvl4pPr>
-            <a:lvl5pPr marL="1828800" indent="0">
+            <a:lvl5pPr marL="1341059" indent="0">
               <a:buNone/>
-              <a:defRPr sz="1000"/>
+              <a:defRPr sz="733"/>
             </a:lvl5pPr>
-            <a:lvl6pPr marL="2286000" indent="0">
+            <a:lvl6pPr marL="1676324" indent="0">
               <a:buNone/>
-              <a:defRPr sz="1000"/>
+              <a:defRPr sz="733"/>
             </a:lvl6pPr>
-            <a:lvl7pPr marL="2743200" indent="0">
+            <a:lvl7pPr marL="2011589" indent="0">
               <a:buNone/>
-              <a:defRPr sz="1000"/>
+              <a:defRPr sz="733"/>
             </a:lvl7pPr>
-            <a:lvl8pPr marL="3200400" indent="0">
+            <a:lvl8pPr marL="2346853" indent="0">
               <a:buNone/>
-              <a:defRPr sz="1000"/>
+              <a:defRPr sz="733"/>
             </a:lvl8pPr>
-            <a:lvl9pPr marL="3657600" indent="0">
+            <a:lvl9pPr marL="2682118" indent="0">
               <a:buNone/>
-              <a:defRPr sz="1000"/>
+              <a:defRPr sz="733"/>
             </a:lvl9pPr>
           </a:lstStyle>
           <a:p>
             <a:pPr lvl="0"/>
             <a:r>
-              <a:rPr lang="en-US" smtClean="0"/>
-              <a:t>Click to edit Master text styles</a:t>
+              <a:rPr lang="en-US"/>
+              <a:t>Edit Master text styles</a:t>
             </a:r>
           </a:p>
         </p:txBody>
@@ -2098,7 +2102,7 @@
           <a:p>
             <a:fld id="{670F4037-AF96-4A4B-AD90-5273BA30825A}" type="datetimeFigureOut">
               <a:rPr lang="en-US" smtClean="0"/>
-              <a:t>1/27/2017</a:t>
+              <a:t>11/9/2017</a:t>
             </a:fld>
             <a:endParaRPr lang="en-US"/>
           </a:p>
@@ -2149,7 +2153,7 @@
     </p:spTree>
     <p:extLst>
       <p:ext uri="{BB962C8B-B14F-4D97-AF65-F5344CB8AC3E}">
-        <p14:creationId xmlns:p14="http://schemas.microsoft.com/office/powerpoint/2010/main" val="2929282604"/>
+        <p14:creationId xmlns:p14="http://schemas.microsoft.com/office/powerpoint/2010/main" val="987863611"/>
       </p:ext>
     </p:extLst>
   </p:cSld>
@@ -2188,23 +2192,23 @@
         </p:nvSpPr>
         <p:spPr>
           <a:xfrm>
-            <a:off x="839788" y="457200"/>
-            <a:ext cx="3932237" cy="1600200"/>
+            <a:off x="839789" y="335280"/>
+            <a:ext cx="3932237" cy="1173480"/>
           </a:xfrm>
         </p:spPr>
         <p:txBody>
           <a:bodyPr anchor="b"/>
           <a:lstStyle>
             <a:lvl1pPr>
-              <a:defRPr sz="3200"/>
+              <a:defRPr sz="2347"/>
             </a:lvl1pPr>
           </a:lstStyle>
           <a:p>
             <a:r>
-              <a:rPr lang="en-US" smtClean="0"/>
+              <a:rPr lang="en-US"/>
               <a:t>Click to edit Master title style</a:t>
             </a:r>
-            <a:endParaRPr lang="en-US"/>
+            <a:endParaRPr lang="en-US" dirty="0"/>
           </a:p>
         </p:txBody>
       </p:sp>
@@ -2212,7 +2216,7 @@
         <p:nvSpPr>
           <p:cNvPr id="3" name="Picture Placeholder 2"/>
           <p:cNvSpPr>
-            <a:spLocks noGrp="1"/>
+            <a:spLocks noGrp="1" noChangeAspect="1"/>
           </p:cNvSpPr>
           <p:nvPr>
             <p:ph type="pic" idx="1"/>
@@ -2220,52 +2224,56 @@
         </p:nvSpPr>
         <p:spPr>
           <a:xfrm>
-            <a:off x="5183188" y="987425"/>
-            <a:ext cx="6172200" cy="4873625"/>
-          </a:xfrm>
-        </p:spPr>
-        <p:txBody>
-          <a:bodyPr/>
+            <a:off x="5183188" y="724112"/>
+            <a:ext cx="6172200" cy="3573992"/>
+          </a:xfrm>
+        </p:spPr>
+        <p:txBody>
+          <a:bodyPr anchor="t"/>
           <a:lstStyle>
             <a:lvl1pPr marL="0" indent="0">
               <a:buNone/>
-              <a:defRPr sz="3200"/>
+              <a:defRPr sz="2347"/>
             </a:lvl1pPr>
-            <a:lvl2pPr marL="457200" indent="0">
+            <a:lvl2pPr marL="335265" indent="0">
               <a:buNone/>
-              <a:defRPr sz="2800"/>
+              <a:defRPr sz="2053"/>
             </a:lvl2pPr>
-            <a:lvl3pPr marL="914400" indent="0">
+            <a:lvl3pPr marL="670530" indent="0">
               <a:buNone/>
-              <a:defRPr sz="2400"/>
+              <a:defRPr sz="1760"/>
             </a:lvl3pPr>
-            <a:lvl4pPr marL="1371600" indent="0">
+            <a:lvl4pPr marL="1005794" indent="0">
               <a:buNone/>
-              <a:defRPr sz="2000"/>
+              <a:defRPr sz="1467"/>
             </a:lvl4pPr>
-            <a:lvl5pPr marL="1828800" indent="0">
+            <a:lvl5pPr marL="1341059" indent="0">
               <a:buNone/>
-              <a:defRPr sz="2000"/>
+              <a:defRPr sz="1467"/>
             </a:lvl5pPr>
-            <a:lvl6pPr marL="2286000" indent="0">
+            <a:lvl6pPr marL="1676324" indent="0">
               <a:buNone/>
-              <a:defRPr sz="2000"/>
+              <a:defRPr sz="1467"/>
             </a:lvl6pPr>
-            <a:lvl7pPr marL="2743200" indent="0">
+            <a:lvl7pPr marL="2011589" indent="0">
               <a:buNone/>
-              <a:defRPr sz="2000"/>
+              <a:defRPr sz="1467"/>
             </a:lvl7pPr>
-            <a:lvl8pPr marL="3200400" indent="0">
+            <a:lvl8pPr marL="2346853" indent="0">
               <a:buNone/>
-              <a:defRPr sz="2000"/>
+              <a:defRPr sz="1467"/>
             </a:lvl8pPr>
-            <a:lvl9pPr marL="3657600" indent="0">
+            <a:lvl9pPr marL="2682118" indent="0">
               <a:buNone/>
-              <a:defRPr sz="2000"/>
+              <a:defRPr sz="1467"/>
             </a:lvl9pPr>
           </a:lstStyle>
           <a:p>
-            <a:endParaRPr lang="en-US"/>
+            <a:r>
+              <a:rPr lang="en-US"/>
+              <a:t>Click icon to add picture</a:t>
+            </a:r>
+            <a:endParaRPr lang="en-US" dirty="0"/>
           </a:p>
         </p:txBody>
       </p:sp>
@@ -2281,8 +2289,8 @@
         </p:nvSpPr>
         <p:spPr>
           <a:xfrm>
-            <a:off x="839788" y="2057400"/>
-            <a:ext cx="3932237" cy="3811588"/>
+            <a:off x="839789" y="1508760"/>
+            <a:ext cx="3932237" cy="2795165"/>
           </a:xfrm>
         </p:spPr>
         <p:txBody>
@@ -2290,46 +2298,46 @@
           <a:lstStyle>
             <a:lvl1pPr marL="0" indent="0">
               <a:buNone/>
-              <a:defRPr sz="1600"/>
+              <a:defRPr sz="1173"/>
             </a:lvl1pPr>
-            <a:lvl2pPr marL="457200" indent="0">
+            <a:lvl2pPr marL="335265" indent="0">
               <a:buNone/>
-              <a:defRPr sz="1400"/>
+              <a:defRPr sz="1027"/>
             </a:lvl2pPr>
-            <a:lvl3pPr marL="914400" indent="0">
+            <a:lvl3pPr marL="670530" indent="0">
               <a:buNone/>
-              <a:defRPr sz="1200"/>
+              <a:defRPr sz="880"/>
             </a:lvl3pPr>
-            <a:lvl4pPr marL="1371600" indent="0">
+            <a:lvl4pPr marL="1005794" indent="0">
               <a:buNone/>
-              <a:defRPr sz="1000"/>
+              <a:defRPr sz="733"/>
             </a:lvl4pPr>
-            <a:lvl5pPr marL="1828800" indent="0">
+            <a:lvl5pPr marL="1341059" indent="0">
               <a:buNone/>
-              <a:defRPr sz="1000"/>
+              <a:defRPr sz="733"/>
             </a:lvl5pPr>
-            <a:lvl6pPr marL="2286000" indent="0">
+            <a:lvl6pPr marL="1676324" indent="0">
               <a:buNone/>
-              <a:defRPr sz="1000"/>
+              <a:defRPr sz="733"/>
             </a:lvl6pPr>
-            <a:lvl7pPr marL="2743200" indent="0">
+            <a:lvl7pPr marL="2011589" indent="0">
               <a:buNone/>
-              <a:defRPr sz="1000"/>
+              <a:defRPr sz="733"/>
             </a:lvl7pPr>
-            <a:lvl8pPr marL="3200400" indent="0">
+            <a:lvl8pPr marL="2346853" indent="0">
               <a:buNone/>
-              <a:defRPr sz="1000"/>
+              <a:defRPr sz="733"/>
             </a:lvl8pPr>
-            <a:lvl9pPr marL="3657600" indent="0">
+            <a:lvl9pPr marL="2682118" indent="0">
               <a:buNone/>
-              <a:defRPr sz="1000"/>
+              <a:defRPr sz="733"/>
             </a:lvl9pPr>
           </a:lstStyle>
           <a:p>
             <a:pPr lvl="0"/>
             <a:r>
-              <a:rPr lang="en-US" smtClean="0"/>
-              <a:t>Click to edit Master text styles</a:t>
+              <a:rPr lang="en-US"/>
+              <a:t>Edit Master text styles</a:t>
             </a:r>
           </a:p>
         </p:txBody>
@@ -2351,7 +2359,7 @@
           <a:p>
             <a:fld id="{670F4037-AF96-4A4B-AD90-5273BA30825A}" type="datetimeFigureOut">
               <a:rPr lang="en-US" smtClean="0"/>
-              <a:t>1/27/2017</a:t>
+              <a:t>11/9/2017</a:t>
             </a:fld>
             <a:endParaRPr lang="en-US"/>
           </a:p>
@@ -2402,7 +2410,7 @@
     </p:spTree>
     <p:extLst>
       <p:ext uri="{BB962C8B-B14F-4D97-AF65-F5344CB8AC3E}">
-        <p14:creationId xmlns:p14="http://schemas.microsoft.com/office/powerpoint/2010/main" val="2679561808"/>
+        <p14:creationId xmlns:p14="http://schemas.microsoft.com/office/powerpoint/2010/main" val="333720800"/>
       </p:ext>
     </p:extLst>
   </p:cSld>
@@ -2446,8 +2454,8 @@
         </p:nvSpPr>
         <p:spPr>
           <a:xfrm>
-            <a:off x="838200" y="365125"/>
-            <a:ext cx="10515600" cy="1325563"/>
+            <a:off x="838200" y="267758"/>
+            <a:ext cx="10515600" cy="972080"/>
           </a:xfrm>
           <a:prstGeom prst="rect">
             <a:avLst/>
@@ -2460,10 +2468,10 @@
           <a:lstStyle/>
           <a:p>
             <a:r>
-              <a:rPr lang="en-US" smtClean="0"/>
+              <a:rPr lang="en-US"/>
               <a:t>Click to edit Master title style</a:t>
             </a:r>
-            <a:endParaRPr lang="en-US"/>
+            <a:endParaRPr lang="en-US" dirty="0"/>
           </a:p>
         </p:txBody>
       </p:sp>
@@ -2479,8 +2487,8 @@
         </p:nvSpPr>
         <p:spPr>
           <a:xfrm>
-            <a:off x="838200" y="1825625"/>
-            <a:ext cx="10515600" cy="4351338"/>
+            <a:off x="838200" y="1338792"/>
+            <a:ext cx="10515600" cy="3190981"/>
           </a:xfrm>
           <a:prstGeom prst="rect">
             <a:avLst/>
@@ -2494,38 +2502,38 @@
           <a:p>
             <a:pPr lvl="0"/>
             <a:r>
-              <a:rPr lang="en-US" smtClean="0"/>
-              <a:t>Click to edit Master text styles</a:t>
+              <a:rPr lang="en-US"/>
+              <a:t>Edit Master text styles</a:t>
             </a:r>
           </a:p>
           <a:p>
             <a:pPr lvl="1"/>
             <a:r>
-              <a:rPr lang="en-US" smtClean="0"/>
+              <a:rPr lang="en-US"/>
               <a:t>Second level</a:t>
             </a:r>
           </a:p>
           <a:p>
             <a:pPr lvl="2"/>
             <a:r>
-              <a:rPr lang="en-US" smtClean="0"/>
+              <a:rPr lang="en-US"/>
               <a:t>Third level</a:t>
             </a:r>
           </a:p>
           <a:p>
             <a:pPr lvl="3"/>
             <a:r>
-              <a:rPr lang="en-US" smtClean="0"/>
+              <a:rPr lang="en-US"/>
               <a:t>Fourth level</a:t>
             </a:r>
           </a:p>
           <a:p>
             <a:pPr lvl="4"/>
             <a:r>
-              <a:rPr lang="en-US" smtClean="0"/>
+              <a:rPr lang="en-US"/>
               <a:t>Fifth level</a:t>
             </a:r>
-            <a:endParaRPr lang="en-US"/>
+            <a:endParaRPr lang="en-US" dirty="0"/>
           </a:p>
         </p:txBody>
       </p:sp>
@@ -2541,8 +2549,8 @@
         </p:nvSpPr>
         <p:spPr>
           <a:xfrm>
-            <a:off x="838200" y="6356350"/>
-            <a:ext cx="2743200" cy="365125"/>
+            <a:off x="838200" y="4661324"/>
+            <a:ext cx="2743200" cy="267758"/>
           </a:xfrm>
           <a:prstGeom prst="rect">
             <a:avLst/>
@@ -2552,7 +2560,7 @@
           <a:bodyPr vert="horz" lIns="91440" tIns="45720" rIns="91440" bIns="45720" rtlCol="0" anchor="ctr"/>
           <a:lstStyle>
             <a:lvl1pPr algn="l">
-              <a:defRPr sz="1200">
+              <a:defRPr sz="880">
                 <a:solidFill>
                   <a:schemeClr val="tx1">
                     <a:tint val="75000"/>
@@ -2564,7 +2572,7 @@
           <a:p>
             <a:fld id="{670F4037-AF96-4A4B-AD90-5273BA30825A}" type="datetimeFigureOut">
               <a:rPr lang="en-US" smtClean="0"/>
-              <a:t>1/27/2017</a:t>
+              <a:t>11/9/2017</a:t>
             </a:fld>
             <a:endParaRPr lang="en-US"/>
           </a:p>
@@ -2582,8 +2590,8 @@
         </p:nvSpPr>
         <p:spPr>
           <a:xfrm>
-            <a:off x="4038600" y="6356350"/>
-            <a:ext cx="4114800" cy="365125"/>
+            <a:off x="4038600" y="4661324"/>
+            <a:ext cx="4114800" cy="267758"/>
           </a:xfrm>
           <a:prstGeom prst="rect">
             <a:avLst/>
@@ -2593,7 +2601,7 @@
           <a:bodyPr vert="horz" lIns="91440" tIns="45720" rIns="91440" bIns="45720" rtlCol="0" anchor="ctr"/>
           <a:lstStyle>
             <a:lvl1pPr algn="ctr">
-              <a:defRPr sz="1200">
+              <a:defRPr sz="880">
                 <a:solidFill>
                   <a:schemeClr val="tx1">
                     <a:tint val="75000"/>
@@ -2619,8 +2627,8 @@
         </p:nvSpPr>
         <p:spPr>
           <a:xfrm>
-            <a:off x="8610600" y="6356350"/>
-            <a:ext cx="2743200" cy="365125"/>
+            <a:off x="8610600" y="4661324"/>
+            <a:ext cx="2743200" cy="267758"/>
           </a:xfrm>
           <a:prstGeom prst="rect">
             <a:avLst/>
@@ -2630,7 +2638,7 @@
           <a:bodyPr vert="horz" lIns="91440" tIns="45720" rIns="91440" bIns="45720" rtlCol="0" anchor="ctr"/>
           <a:lstStyle>
             <a:lvl1pPr algn="r">
-              <a:defRPr sz="1200">
+              <a:defRPr sz="880">
                 <a:solidFill>
                   <a:schemeClr val="tx1">
                     <a:tint val="75000"/>
@@ -2651,27 +2659,27 @@
     </p:spTree>
     <p:extLst>
       <p:ext uri="{BB962C8B-B14F-4D97-AF65-F5344CB8AC3E}">
-        <p14:creationId xmlns:p14="http://schemas.microsoft.com/office/powerpoint/2010/main" val="3448074325"/>
+        <p14:creationId xmlns:p14="http://schemas.microsoft.com/office/powerpoint/2010/main" val="968161785"/>
       </p:ext>
     </p:extLst>
   </p:cSld>
   <p:clrMap bg1="lt1" tx1="dk1" bg2="lt2" tx2="dk2" accent1="accent1" accent2="accent2" accent3="accent3" accent4="accent4" accent5="accent5" accent6="accent6" hlink="hlink" folHlink="folHlink"/>
   <p:sldLayoutIdLst>
-    <p:sldLayoutId id="2147483649" r:id="rId1"/>
-    <p:sldLayoutId id="2147483650" r:id="rId2"/>
-    <p:sldLayoutId id="2147483651" r:id="rId3"/>
-    <p:sldLayoutId id="2147483652" r:id="rId4"/>
-    <p:sldLayoutId id="2147483653" r:id="rId5"/>
-    <p:sldLayoutId id="2147483654" r:id="rId6"/>
-    <p:sldLayoutId id="2147483655" r:id="rId7"/>
-    <p:sldLayoutId id="2147483656" r:id="rId8"/>
-    <p:sldLayoutId id="2147483657" r:id="rId9"/>
-    <p:sldLayoutId id="2147483658" r:id="rId10"/>
-    <p:sldLayoutId id="2147483659" r:id="rId11"/>
+    <p:sldLayoutId id="2147483685" r:id="rId1"/>
+    <p:sldLayoutId id="2147483686" r:id="rId2"/>
+    <p:sldLayoutId id="2147483687" r:id="rId3"/>
+    <p:sldLayoutId id="2147483688" r:id="rId4"/>
+    <p:sldLayoutId id="2147483689" r:id="rId5"/>
+    <p:sldLayoutId id="2147483690" r:id="rId6"/>
+    <p:sldLayoutId id="2147483691" r:id="rId7"/>
+    <p:sldLayoutId id="2147483692" r:id="rId8"/>
+    <p:sldLayoutId id="2147483693" r:id="rId9"/>
+    <p:sldLayoutId id="2147483694" r:id="rId10"/>
+    <p:sldLayoutId id="2147483695" r:id="rId11"/>
   </p:sldLayoutIdLst>
   <p:txStyles>
     <p:titleStyle>
-      <a:lvl1pPr algn="l" defTabSz="914400" rtl="0" eaLnBrk="1" latinLnBrk="0" hangingPunct="1">
+      <a:lvl1pPr algn="l" defTabSz="670530" rtl="0" eaLnBrk="1" latinLnBrk="0" hangingPunct="1">
         <a:lnSpc>
           <a:spcPct val="90000"/>
         </a:lnSpc>
@@ -2679,7 +2687,7 @@
           <a:spcPct val="0"/>
         </a:spcBef>
         <a:buNone/>
-        <a:defRPr sz="4400" kern="1200">
+        <a:defRPr sz="3227" kern="1200">
           <a:solidFill>
             <a:schemeClr val="tx1"/>
           </a:solidFill>
@@ -2690,16 +2698,16 @@
       </a:lvl1pPr>
     </p:titleStyle>
     <p:bodyStyle>
-      <a:lvl1pPr marL="228600" indent="-228600" algn="l" defTabSz="914400" rtl="0" eaLnBrk="1" latinLnBrk="0" hangingPunct="1">
+      <a:lvl1pPr marL="167632" indent="-167632" algn="l" defTabSz="670530" rtl="0" eaLnBrk="1" latinLnBrk="0" hangingPunct="1">
         <a:lnSpc>
           <a:spcPct val="90000"/>
         </a:lnSpc>
         <a:spcBef>
-          <a:spcPts val="1000"/>
+          <a:spcPts val="733"/>
         </a:spcBef>
         <a:buFont typeface="Arial" panose="020B0604020202020204" pitchFamily="34" charset="0"/>
         <a:buChar char="•"/>
-        <a:defRPr sz="2800" kern="1200">
+        <a:defRPr sz="2053" kern="1200">
           <a:solidFill>
             <a:schemeClr val="tx1"/>
           </a:solidFill>
@@ -2708,16 +2716,16 @@
           <a:cs typeface="+mn-cs"/>
         </a:defRPr>
       </a:lvl1pPr>
-      <a:lvl2pPr marL="685800" indent="-228600" algn="l" defTabSz="914400" rtl="0" eaLnBrk="1" latinLnBrk="0" hangingPunct="1">
+      <a:lvl2pPr marL="502897" indent="-167632" algn="l" defTabSz="670530" rtl="0" eaLnBrk="1" latinLnBrk="0" hangingPunct="1">
         <a:lnSpc>
           <a:spcPct val="90000"/>
         </a:lnSpc>
         <a:spcBef>
-          <a:spcPts val="500"/>
+          <a:spcPts val="367"/>
         </a:spcBef>
         <a:buFont typeface="Arial" panose="020B0604020202020204" pitchFamily="34" charset="0"/>
         <a:buChar char="•"/>
-        <a:defRPr sz="2400" kern="1200">
+        <a:defRPr sz="1760" kern="1200">
           <a:solidFill>
             <a:schemeClr val="tx1"/>
           </a:solidFill>
@@ -2726,16 +2734,16 @@
           <a:cs typeface="+mn-cs"/>
         </a:defRPr>
       </a:lvl2pPr>
-      <a:lvl3pPr marL="1143000" indent="-228600" algn="l" defTabSz="914400" rtl="0" eaLnBrk="1" latinLnBrk="0" hangingPunct="1">
+      <a:lvl3pPr marL="838162" indent="-167632" algn="l" defTabSz="670530" rtl="0" eaLnBrk="1" latinLnBrk="0" hangingPunct="1">
         <a:lnSpc>
           <a:spcPct val="90000"/>
         </a:lnSpc>
         <a:spcBef>
-          <a:spcPts val="500"/>
+          <a:spcPts val="367"/>
         </a:spcBef>
         <a:buFont typeface="Arial" panose="020B0604020202020204" pitchFamily="34" charset="0"/>
         <a:buChar char="•"/>
-        <a:defRPr sz="2000" kern="1200">
+        <a:defRPr sz="1467" kern="1200">
           <a:solidFill>
             <a:schemeClr val="tx1"/>
           </a:solidFill>
@@ -2744,16 +2752,16 @@
           <a:cs typeface="+mn-cs"/>
         </a:defRPr>
       </a:lvl3pPr>
-      <a:lvl4pPr marL="1600200" indent="-228600" algn="l" defTabSz="914400" rtl="0" eaLnBrk="1" latinLnBrk="0" hangingPunct="1">
+      <a:lvl4pPr marL="1173427" indent="-167632" algn="l" defTabSz="670530" rtl="0" eaLnBrk="1" latinLnBrk="0" hangingPunct="1">
         <a:lnSpc>
           <a:spcPct val="90000"/>
         </a:lnSpc>
         <a:spcBef>
-          <a:spcPts val="500"/>
+          <a:spcPts val="367"/>
         </a:spcBef>
         <a:buFont typeface="Arial" panose="020B0604020202020204" pitchFamily="34" charset="0"/>
         <a:buChar char="•"/>
-        <a:defRPr sz="1800" kern="1200">
+        <a:defRPr sz="1320" kern="1200">
           <a:solidFill>
             <a:schemeClr val="tx1"/>
           </a:solidFill>
@@ -2762,16 +2770,16 @@
           <a:cs typeface="+mn-cs"/>
         </a:defRPr>
       </a:lvl4pPr>
-      <a:lvl5pPr marL="2057400" indent="-228600" algn="l" defTabSz="914400" rtl="0" eaLnBrk="1" latinLnBrk="0" hangingPunct="1">
+      <a:lvl5pPr marL="1508691" indent="-167632" algn="l" defTabSz="670530" rtl="0" eaLnBrk="1" latinLnBrk="0" hangingPunct="1">
         <a:lnSpc>
           <a:spcPct val="90000"/>
         </a:lnSpc>
         <a:spcBef>
-          <a:spcPts val="500"/>
+          <a:spcPts val="367"/>
         </a:spcBef>
         <a:buFont typeface="Arial" panose="020B0604020202020204" pitchFamily="34" charset="0"/>
         <a:buChar char="•"/>
-        <a:defRPr sz="1800" kern="1200">
+        <a:defRPr sz="1320" kern="1200">
           <a:solidFill>
             <a:schemeClr val="tx1"/>
           </a:solidFill>
@@ -2780,16 +2788,16 @@
           <a:cs typeface="+mn-cs"/>
         </a:defRPr>
       </a:lvl5pPr>
-      <a:lvl6pPr marL="2514600" indent="-228600" algn="l" defTabSz="914400" rtl="0" eaLnBrk="1" latinLnBrk="0" hangingPunct="1">
+      <a:lvl6pPr marL="1843956" indent="-167632" algn="l" defTabSz="670530" rtl="0" eaLnBrk="1" latinLnBrk="0" hangingPunct="1">
         <a:lnSpc>
           <a:spcPct val="90000"/>
         </a:lnSpc>
         <a:spcBef>
-          <a:spcPts val="500"/>
+          <a:spcPts val="367"/>
         </a:spcBef>
         <a:buFont typeface="Arial" panose="020B0604020202020204" pitchFamily="34" charset="0"/>
         <a:buChar char="•"/>
-        <a:defRPr sz="1800" kern="1200">
+        <a:defRPr sz="1320" kern="1200">
           <a:solidFill>
             <a:schemeClr val="tx1"/>
           </a:solidFill>
@@ -2798,16 +2806,16 @@
           <a:cs typeface="+mn-cs"/>
         </a:defRPr>
       </a:lvl6pPr>
-      <a:lvl7pPr marL="2971800" indent="-228600" algn="l" defTabSz="914400" rtl="0" eaLnBrk="1" latinLnBrk="0" hangingPunct="1">
+      <a:lvl7pPr marL="2179221" indent="-167632" algn="l" defTabSz="670530" rtl="0" eaLnBrk="1" latinLnBrk="0" hangingPunct="1">
         <a:lnSpc>
           <a:spcPct val="90000"/>
         </a:lnSpc>
         <a:spcBef>
-          <a:spcPts val="500"/>
+          <a:spcPts val="367"/>
         </a:spcBef>
         <a:buFont typeface="Arial" panose="020B0604020202020204" pitchFamily="34" charset="0"/>
         <a:buChar char="•"/>
-        <a:defRPr sz="1800" kern="1200">
+        <a:defRPr sz="1320" kern="1200">
           <a:solidFill>
             <a:schemeClr val="tx1"/>
           </a:solidFill>
@@ -2816,16 +2824,16 @@
           <a:cs typeface="+mn-cs"/>
         </a:defRPr>
       </a:lvl7pPr>
-      <a:lvl8pPr marL="3429000" indent="-228600" algn="l" defTabSz="914400" rtl="0" eaLnBrk="1" latinLnBrk="0" hangingPunct="1">
+      <a:lvl8pPr marL="2514486" indent="-167632" algn="l" defTabSz="670530" rtl="0" eaLnBrk="1" latinLnBrk="0" hangingPunct="1">
         <a:lnSpc>
           <a:spcPct val="90000"/>
         </a:lnSpc>
         <a:spcBef>
-          <a:spcPts val="500"/>
+          <a:spcPts val="367"/>
         </a:spcBef>
         <a:buFont typeface="Arial" panose="020B0604020202020204" pitchFamily="34" charset="0"/>
         <a:buChar char="•"/>
-        <a:defRPr sz="1800" kern="1200">
+        <a:defRPr sz="1320" kern="1200">
           <a:solidFill>
             <a:schemeClr val="tx1"/>
           </a:solidFill>
@@ -2834,16 +2842,16 @@
           <a:cs typeface="+mn-cs"/>
         </a:defRPr>
       </a:lvl8pPr>
-      <a:lvl9pPr marL="3886200" indent="-228600" algn="l" defTabSz="914400" rtl="0" eaLnBrk="1" latinLnBrk="0" hangingPunct="1">
+      <a:lvl9pPr marL="2849750" indent="-167632" algn="l" defTabSz="670530" rtl="0" eaLnBrk="1" latinLnBrk="0" hangingPunct="1">
         <a:lnSpc>
           <a:spcPct val="90000"/>
         </a:lnSpc>
         <a:spcBef>
-          <a:spcPts val="500"/>
+          <a:spcPts val="367"/>
         </a:spcBef>
         <a:buFont typeface="Arial" panose="020B0604020202020204" pitchFamily="34" charset="0"/>
         <a:buChar char="•"/>
-        <a:defRPr sz="1800" kern="1200">
+        <a:defRPr sz="1320" kern="1200">
           <a:solidFill>
             <a:schemeClr val="tx1"/>
           </a:solidFill>
@@ -2857,8 +2865,8 @@
       <a:defPPr>
         <a:defRPr lang="en-US"/>
       </a:defPPr>
-      <a:lvl1pPr marL="0" algn="l" defTabSz="914400" rtl="0" eaLnBrk="1" latinLnBrk="0" hangingPunct="1">
-        <a:defRPr sz="1800" kern="1200">
+      <a:lvl1pPr marL="0" algn="l" defTabSz="670530" rtl="0" eaLnBrk="1" latinLnBrk="0" hangingPunct="1">
+        <a:defRPr sz="1320" kern="1200">
           <a:solidFill>
             <a:schemeClr val="tx1"/>
           </a:solidFill>
@@ -2867,8 +2875,8 @@
           <a:cs typeface="+mn-cs"/>
         </a:defRPr>
       </a:lvl1pPr>
-      <a:lvl2pPr marL="457200" algn="l" defTabSz="914400" rtl="0" eaLnBrk="1" latinLnBrk="0" hangingPunct="1">
-        <a:defRPr sz="1800" kern="1200">
+      <a:lvl2pPr marL="335265" algn="l" defTabSz="670530" rtl="0" eaLnBrk="1" latinLnBrk="0" hangingPunct="1">
+        <a:defRPr sz="1320" kern="1200">
           <a:solidFill>
             <a:schemeClr val="tx1"/>
           </a:solidFill>
@@ -2877,8 +2885,8 @@
           <a:cs typeface="+mn-cs"/>
         </a:defRPr>
       </a:lvl2pPr>
-      <a:lvl3pPr marL="914400" algn="l" defTabSz="914400" rtl="0" eaLnBrk="1" latinLnBrk="0" hangingPunct="1">
-        <a:defRPr sz="1800" kern="1200">
+      <a:lvl3pPr marL="670530" algn="l" defTabSz="670530" rtl="0" eaLnBrk="1" latinLnBrk="0" hangingPunct="1">
+        <a:defRPr sz="1320" kern="1200">
           <a:solidFill>
             <a:schemeClr val="tx1"/>
           </a:solidFill>
@@ -2887,8 +2895,8 @@
           <a:cs typeface="+mn-cs"/>
         </a:defRPr>
       </a:lvl3pPr>
-      <a:lvl4pPr marL="1371600" algn="l" defTabSz="914400" rtl="0" eaLnBrk="1" latinLnBrk="0" hangingPunct="1">
-        <a:defRPr sz="1800" kern="1200">
+      <a:lvl4pPr marL="1005794" algn="l" defTabSz="670530" rtl="0" eaLnBrk="1" latinLnBrk="0" hangingPunct="1">
+        <a:defRPr sz="1320" kern="1200">
           <a:solidFill>
             <a:schemeClr val="tx1"/>
           </a:solidFill>
@@ -2897,8 +2905,8 @@
           <a:cs typeface="+mn-cs"/>
         </a:defRPr>
       </a:lvl4pPr>
-      <a:lvl5pPr marL="1828800" algn="l" defTabSz="914400" rtl="0" eaLnBrk="1" latinLnBrk="0" hangingPunct="1">
-        <a:defRPr sz="1800" kern="1200">
+      <a:lvl5pPr marL="1341059" algn="l" defTabSz="670530" rtl="0" eaLnBrk="1" latinLnBrk="0" hangingPunct="1">
+        <a:defRPr sz="1320" kern="1200">
           <a:solidFill>
             <a:schemeClr val="tx1"/>
           </a:solidFill>
@@ -2907,8 +2915,8 @@
           <a:cs typeface="+mn-cs"/>
         </a:defRPr>
       </a:lvl5pPr>
-      <a:lvl6pPr marL="2286000" algn="l" defTabSz="914400" rtl="0" eaLnBrk="1" latinLnBrk="0" hangingPunct="1">
-        <a:defRPr sz="1800" kern="1200">
+      <a:lvl6pPr marL="1676324" algn="l" defTabSz="670530" rtl="0" eaLnBrk="1" latinLnBrk="0" hangingPunct="1">
+        <a:defRPr sz="1320" kern="1200">
           <a:solidFill>
             <a:schemeClr val="tx1"/>
           </a:solidFill>
@@ -2917,8 +2925,8 @@
           <a:cs typeface="+mn-cs"/>
         </a:defRPr>
       </a:lvl6pPr>
-      <a:lvl7pPr marL="2743200" algn="l" defTabSz="914400" rtl="0" eaLnBrk="1" latinLnBrk="0" hangingPunct="1">
-        <a:defRPr sz="1800" kern="1200">
+      <a:lvl7pPr marL="2011589" algn="l" defTabSz="670530" rtl="0" eaLnBrk="1" latinLnBrk="0" hangingPunct="1">
+        <a:defRPr sz="1320" kern="1200">
           <a:solidFill>
             <a:schemeClr val="tx1"/>
           </a:solidFill>
@@ -2927,8 +2935,8 @@
           <a:cs typeface="+mn-cs"/>
         </a:defRPr>
       </a:lvl7pPr>
-      <a:lvl8pPr marL="3200400" algn="l" defTabSz="914400" rtl="0" eaLnBrk="1" latinLnBrk="0" hangingPunct="1">
-        <a:defRPr sz="1800" kern="1200">
+      <a:lvl8pPr marL="2346853" algn="l" defTabSz="670530" rtl="0" eaLnBrk="1" latinLnBrk="0" hangingPunct="1">
+        <a:defRPr sz="1320" kern="1200">
           <a:solidFill>
             <a:schemeClr val="tx1"/>
           </a:solidFill>
@@ -2937,8 +2945,8 @@
           <a:cs typeface="+mn-cs"/>
         </a:defRPr>
       </a:lvl8pPr>
-      <a:lvl9pPr marL="3657600" algn="l" defTabSz="914400" rtl="0" eaLnBrk="1" latinLnBrk="0" hangingPunct="1">
-        <a:defRPr sz="1800" kern="1200">
+      <a:lvl9pPr marL="2682118" algn="l" defTabSz="670530" rtl="0" eaLnBrk="1" latinLnBrk="0" hangingPunct="1">
+        <a:defRPr sz="1320" kern="1200">
           <a:solidFill>
             <a:schemeClr val="tx1"/>
           </a:solidFill>
@@ -2971,18 +2979,153 @@
       </p:grpSpPr>
       <p:sp>
         <p:nvSpPr>
+          <p:cNvPr id="103" name="TextBox 102"/>
+          <p:cNvSpPr txBox="1"/>
+          <p:nvPr/>
+        </p:nvSpPr>
+        <p:spPr>
+          <a:xfrm>
+            <a:off x="7579748" y="-83862"/>
+            <a:ext cx="2202847" cy="430887"/>
+          </a:xfrm>
+          <a:prstGeom prst="rect">
+            <a:avLst/>
+          </a:prstGeom>
+          <a:noFill/>
+        </p:spPr>
+        <p:txBody>
+          <a:bodyPr wrap="none" rtlCol="0">
+            <a:spAutoFit/>
+          </a:bodyPr>
+          <a:lstStyle/>
+          <a:p>
+            <a:r>
+              <a:rPr lang="en-US" sz="2200" b="1" dirty="0"/>
+              <a:t>  vL3 -&gt; loopLink1</a:t>
+            </a:r>
+          </a:p>
+        </p:txBody>
+      </p:sp>
+      <p:sp>
+        <p:nvSpPr>
+          <p:cNvPr id="94" name="Rectangle 93">
+            <a:extLst>
+              <a:ext uri="{FF2B5EF4-FFF2-40B4-BE49-F238E27FC236}">
+                <a16:creationId xmlns:a16="http://schemas.microsoft.com/office/drawing/2014/main" id="{EDC46E18-F053-445A-887C-5EA69B6FC70A}"/>
+              </a:ext>
+            </a:extLst>
+          </p:cNvPr>
+          <p:cNvSpPr/>
+          <p:nvPr/>
+        </p:nvSpPr>
+        <p:spPr>
+          <a:xfrm>
+            <a:off x="5066487" y="3675479"/>
+            <a:ext cx="270996" cy="143563"/>
+          </a:xfrm>
+          <a:prstGeom prst="rect">
+            <a:avLst/>
+          </a:prstGeom>
+          <a:solidFill>
+            <a:schemeClr val="accent2"/>
+          </a:solidFill>
+          <a:ln>
+            <a:solidFill>
+              <a:schemeClr val="accent2"/>
+            </a:solidFill>
+          </a:ln>
+        </p:spPr>
+        <p:style>
+          <a:lnRef idx="2">
+            <a:schemeClr val="accent1">
+              <a:shade val="50000"/>
+            </a:schemeClr>
+          </a:lnRef>
+          <a:fillRef idx="1">
+            <a:schemeClr val="accent1"/>
+          </a:fillRef>
+          <a:effectRef idx="0">
+            <a:schemeClr val="accent1"/>
+          </a:effectRef>
+          <a:fontRef idx="minor">
+            <a:schemeClr val="lt1"/>
+          </a:fontRef>
+        </p:style>
+        <p:txBody>
+          <a:bodyPr rtlCol="0" anchor="ctr"/>
+          <a:lstStyle/>
+          <a:p>
+            <a:pPr algn="ctr"/>
+            <a:endParaRPr lang="en-US" sz="2400" dirty="0"/>
+          </a:p>
+        </p:txBody>
+      </p:sp>
+      <p:sp>
+        <p:nvSpPr>
+          <p:cNvPr id="95" name="Rectangle 94">
+            <a:extLst>
+              <a:ext uri="{FF2B5EF4-FFF2-40B4-BE49-F238E27FC236}">
+                <a16:creationId xmlns:a16="http://schemas.microsoft.com/office/drawing/2014/main" id="{846329FC-74F4-4C9E-BD97-3399DFDFF731}"/>
+              </a:ext>
+            </a:extLst>
+          </p:cNvPr>
+          <p:cNvSpPr/>
+          <p:nvPr/>
+        </p:nvSpPr>
+        <p:spPr>
+          <a:xfrm>
+            <a:off x="5062089" y="3531559"/>
+            <a:ext cx="270996" cy="143563"/>
+          </a:xfrm>
+          <a:prstGeom prst="rect">
+            <a:avLst/>
+          </a:prstGeom>
+          <a:ln>
+            <a:solidFill>
+              <a:schemeClr val="accent1"/>
+            </a:solidFill>
+          </a:ln>
+        </p:spPr>
+        <p:style>
+          <a:lnRef idx="2">
+            <a:schemeClr val="accent1">
+              <a:shade val="50000"/>
+            </a:schemeClr>
+          </a:lnRef>
+          <a:fillRef idx="1">
+            <a:schemeClr val="accent1"/>
+          </a:fillRef>
+          <a:effectRef idx="0">
+            <a:schemeClr val="accent1"/>
+          </a:effectRef>
+          <a:fontRef idx="minor">
+            <a:schemeClr val="lt1"/>
+          </a:fontRef>
+        </p:style>
+        <p:txBody>
+          <a:bodyPr rtlCol="0" anchor="ctr"/>
+          <a:lstStyle/>
+          <a:p>
+            <a:pPr algn="ctr"/>
+            <a:endParaRPr lang="en-US" sz="2400"/>
+          </a:p>
+        </p:txBody>
+      </p:sp>
+      <p:sp>
+        <p:nvSpPr>
           <p:cNvPr id="4" name="Rectangle 3"/>
           <p:cNvSpPr/>
           <p:nvPr/>
         </p:nvSpPr>
         <p:spPr>
           <a:xfrm>
-            <a:off x="2840767" y="3841149"/>
+            <a:off x="2840770" y="3305129"/>
             <a:ext cx="2496065" cy="741406"/>
           </a:xfrm>
           <a:prstGeom prst="rect">
             <a:avLst/>
           </a:prstGeom>
+          <a:noFill/>
         </p:spPr>
         <p:style>
           <a:lnRef idx="2">
@@ -3003,7 +3146,7 @@
           <a:lstStyle/>
           <a:p>
             <a:pPr algn="ctr"/>
-            <a:endParaRPr lang="en-US" b="1" dirty="0">
+            <a:endParaRPr lang="en-US" sz="2400" b="1" dirty="0">
               <a:solidFill>
                 <a:schemeClr val="tx1"/>
               </a:solidFill>
@@ -3019,7 +3162,7 @@
         </p:nvSpPr>
         <p:spPr>
           <a:xfrm>
-            <a:off x="6815524" y="3841149"/>
+            <a:off x="6815527" y="3305129"/>
             <a:ext cx="2496065" cy="741406"/>
           </a:xfrm>
           <a:prstGeom prst="rect">
@@ -3045,7 +3188,7 @@
           <a:lstStyle/>
           <a:p>
             <a:pPr algn="ctr"/>
-            <a:endParaRPr lang="en-US" b="1">
+            <a:endParaRPr lang="en-US" sz="2400" b="1">
               <a:solidFill>
                 <a:schemeClr val="tx1"/>
               </a:solidFill>
@@ -3064,7 +3207,7 @@
         </p:nvCxnSpPr>
         <p:spPr>
           <a:xfrm>
-            <a:off x="5336832" y="4207733"/>
+            <a:off x="5336832" y="3671716"/>
             <a:ext cx="1478692" cy="4119"/>
           </a:xfrm>
           <a:prstGeom prst="line">
@@ -3094,12 +3237,13 @@
         </p:nvSpPr>
         <p:spPr>
           <a:xfrm>
-            <a:off x="5064983" y="4063571"/>
+            <a:off x="5064986" y="3527551"/>
             <a:ext cx="271849" cy="288324"/>
           </a:xfrm>
           <a:prstGeom prst="rect">
             <a:avLst/>
           </a:prstGeom>
+          <a:noFill/>
         </p:spPr>
         <p:style>
           <a:lnRef idx="2">
@@ -3121,18 +3265,13 @@
           <a:p>
             <a:pPr algn="ctr"/>
             <a:r>
-              <a:rPr lang="en-US" b="1" dirty="0" smtClean="0">
+              <a:rPr lang="en-US" sz="2400" b="1" dirty="0">
                 <a:solidFill>
                   <a:schemeClr val="tx1"/>
                 </a:solidFill>
               </a:rPr>
               <a:t>5</a:t>
             </a:r>
-            <a:endParaRPr lang="en-US" b="1" dirty="0">
-              <a:solidFill>
-                <a:schemeClr val="tx1"/>
-              </a:solidFill>
-            </a:endParaRPr>
           </a:p>
         </p:txBody>
       </p:sp>
@@ -3144,12 +3283,15 @@
         </p:nvSpPr>
         <p:spPr>
           <a:xfrm>
-            <a:off x="6815523" y="4063571"/>
+            <a:off x="6815526" y="3527551"/>
             <a:ext cx="271849" cy="288324"/>
           </a:xfrm>
           <a:prstGeom prst="rect">
             <a:avLst/>
           </a:prstGeom>
+          <a:solidFill>
+            <a:schemeClr val="accent3"/>
+          </a:solidFill>
         </p:spPr>
         <p:style>
           <a:lnRef idx="2">
@@ -3171,18 +3313,13 @@
           <a:p>
             <a:pPr algn="ctr"/>
             <a:r>
-              <a:rPr lang="en-US" b="1" dirty="0" smtClean="0">
+              <a:rPr lang="en-US" sz="2400" b="1" dirty="0">
                 <a:solidFill>
                   <a:schemeClr val="tx1"/>
                 </a:solidFill>
               </a:rPr>
               <a:t>5</a:t>
             </a:r>
-            <a:endParaRPr lang="en-US" b="1" dirty="0">
-              <a:solidFill>
-                <a:schemeClr val="tx1"/>
-              </a:solidFill>
-            </a:endParaRPr>
           </a:p>
         </p:txBody>
       </p:sp>
@@ -3194,12 +3331,15 @@
         </p:nvSpPr>
         <p:spPr>
           <a:xfrm>
-            <a:off x="3034020" y="4294231"/>
+            <a:off x="3034023" y="3758211"/>
             <a:ext cx="271849" cy="288324"/>
           </a:xfrm>
           <a:prstGeom prst="rect">
             <a:avLst/>
           </a:prstGeom>
+          <a:solidFill>
+            <a:schemeClr val="accent1"/>
+          </a:solidFill>
         </p:spPr>
         <p:style>
           <a:lnRef idx="2">
@@ -3221,18 +3361,13 @@
           <a:p>
             <a:pPr algn="ctr"/>
             <a:r>
-              <a:rPr lang="en-US" b="1" dirty="0" smtClean="0">
+              <a:rPr lang="en-US" sz="2400" b="1" dirty="0">
                 <a:solidFill>
                   <a:schemeClr val="tx1"/>
                 </a:solidFill>
               </a:rPr>
               <a:t>1</a:t>
             </a:r>
-            <a:endParaRPr lang="en-US" b="1" dirty="0">
-              <a:solidFill>
-                <a:schemeClr val="tx1"/>
-              </a:solidFill>
-            </a:endParaRPr>
           </a:p>
         </p:txBody>
       </p:sp>
@@ -3244,12 +3379,15 @@
         </p:nvSpPr>
         <p:spPr>
           <a:xfrm>
-            <a:off x="3545102" y="4294231"/>
+            <a:off x="3545105" y="3758211"/>
             <a:ext cx="271849" cy="288324"/>
           </a:xfrm>
           <a:prstGeom prst="rect">
             <a:avLst/>
           </a:prstGeom>
+          <a:solidFill>
+            <a:schemeClr val="accent2"/>
+          </a:solidFill>
         </p:spPr>
         <p:style>
           <a:lnRef idx="2">
@@ -3271,18 +3409,13 @@
           <a:p>
             <a:pPr algn="ctr"/>
             <a:r>
-              <a:rPr lang="en-US" b="1" dirty="0" smtClean="0">
+              <a:rPr lang="en-US" sz="2400" b="1" dirty="0">
                 <a:solidFill>
                   <a:schemeClr val="tx1"/>
                 </a:solidFill>
               </a:rPr>
               <a:t>2</a:t>
             </a:r>
-            <a:endParaRPr lang="en-US" b="1" dirty="0">
-              <a:solidFill>
-                <a:schemeClr val="tx1"/>
-              </a:solidFill>
-            </a:endParaRPr>
           </a:p>
         </p:txBody>
       </p:sp>
@@ -3294,12 +3427,15 @@
         </p:nvSpPr>
         <p:spPr>
           <a:xfrm>
-            <a:off x="4049502" y="4294231"/>
+            <a:off x="4049505" y="3758211"/>
             <a:ext cx="271849" cy="288324"/>
           </a:xfrm>
           <a:prstGeom prst="rect">
             <a:avLst/>
           </a:prstGeom>
+          <a:solidFill>
+            <a:schemeClr val="accent1"/>
+          </a:solidFill>
         </p:spPr>
         <p:style>
           <a:lnRef idx="2">
@@ -3321,18 +3457,13 @@
           <a:p>
             <a:pPr algn="ctr"/>
             <a:r>
-              <a:rPr lang="en-US" b="1" dirty="0" smtClean="0">
+              <a:rPr lang="en-US" sz="2400" b="1" dirty="0">
                 <a:solidFill>
                   <a:schemeClr val="tx1"/>
                 </a:solidFill>
               </a:rPr>
               <a:t>3</a:t>
             </a:r>
-            <a:endParaRPr lang="en-US" b="1" dirty="0">
-              <a:solidFill>
-                <a:schemeClr val="tx1"/>
-              </a:solidFill>
-            </a:endParaRPr>
           </a:p>
         </p:txBody>
       </p:sp>
@@ -3344,12 +3475,15 @@
         </p:nvSpPr>
         <p:spPr>
           <a:xfrm>
-            <a:off x="4560583" y="4294231"/>
+            <a:off x="4560586" y="3758211"/>
             <a:ext cx="271849" cy="288324"/>
           </a:xfrm>
           <a:prstGeom prst="rect">
             <a:avLst/>
           </a:prstGeom>
+          <a:solidFill>
+            <a:schemeClr val="accent2"/>
+          </a:solidFill>
         </p:spPr>
         <p:style>
           <a:lnRef idx="2">
@@ -3371,18 +3505,13 @@
           <a:p>
             <a:pPr algn="ctr"/>
             <a:r>
-              <a:rPr lang="en-US" b="1" dirty="0" smtClean="0">
+              <a:rPr lang="en-US" sz="2400" b="1" dirty="0">
                 <a:solidFill>
                   <a:schemeClr val="tx1"/>
                 </a:solidFill>
               </a:rPr>
               <a:t>4</a:t>
             </a:r>
-            <a:endParaRPr lang="en-US" b="1" dirty="0">
-              <a:solidFill>
-                <a:schemeClr val="tx1"/>
-              </a:solidFill>
-            </a:endParaRPr>
           </a:p>
         </p:txBody>
       </p:sp>
@@ -3394,12 +3523,15 @@
         </p:nvSpPr>
         <p:spPr>
           <a:xfrm>
-            <a:off x="7300274" y="4294231"/>
+            <a:off x="7300277" y="3758211"/>
             <a:ext cx="271849" cy="288324"/>
           </a:xfrm>
           <a:prstGeom prst="rect">
             <a:avLst/>
           </a:prstGeom>
+          <a:solidFill>
+            <a:schemeClr val="accent3"/>
+          </a:solidFill>
         </p:spPr>
         <p:style>
           <a:lnRef idx="2">
@@ -3421,18 +3553,13 @@
           <a:p>
             <a:pPr algn="ctr"/>
             <a:r>
-              <a:rPr lang="en-US" b="1" dirty="0" smtClean="0">
+              <a:rPr lang="en-US" sz="2400" b="1" dirty="0">
                 <a:solidFill>
                   <a:schemeClr val="tx1"/>
                 </a:solidFill>
               </a:rPr>
               <a:t>1</a:t>
             </a:r>
-            <a:endParaRPr lang="en-US" b="1" dirty="0">
-              <a:solidFill>
-                <a:schemeClr val="tx1"/>
-              </a:solidFill>
-            </a:endParaRPr>
           </a:p>
         </p:txBody>
       </p:sp>
@@ -3444,7 +3571,7 @@
         </p:nvSpPr>
         <p:spPr>
           <a:xfrm>
-            <a:off x="7811356" y="4294231"/>
+            <a:off x="7811359" y="3758211"/>
             <a:ext cx="271849" cy="288324"/>
           </a:xfrm>
           <a:prstGeom prst="rect">
@@ -3471,18 +3598,13 @@
           <a:p>
             <a:pPr algn="ctr"/>
             <a:r>
-              <a:rPr lang="en-US" b="1" dirty="0" smtClean="0">
+              <a:rPr lang="en-US" sz="2400" b="1" dirty="0">
                 <a:solidFill>
                   <a:schemeClr val="tx1"/>
                 </a:solidFill>
               </a:rPr>
               <a:t>2</a:t>
             </a:r>
-            <a:endParaRPr lang="en-US" b="1" dirty="0">
-              <a:solidFill>
-                <a:schemeClr val="tx1"/>
-              </a:solidFill>
-            </a:endParaRPr>
           </a:p>
         </p:txBody>
       </p:sp>
@@ -3494,7 +3616,7 @@
         </p:nvSpPr>
         <p:spPr>
           <a:xfrm>
-            <a:off x="8315756" y="4294231"/>
+            <a:off x="8315759" y="3758211"/>
             <a:ext cx="271849" cy="288324"/>
           </a:xfrm>
           <a:prstGeom prst="rect">
@@ -3521,18 +3643,13 @@
           <a:p>
             <a:pPr algn="ctr"/>
             <a:r>
-              <a:rPr lang="en-US" b="1" dirty="0" smtClean="0">
+              <a:rPr lang="en-US" sz="2400" b="1" dirty="0">
                 <a:solidFill>
                   <a:schemeClr val="tx1"/>
                 </a:solidFill>
               </a:rPr>
               <a:t>3</a:t>
             </a:r>
-            <a:endParaRPr lang="en-US" b="1" dirty="0">
-              <a:solidFill>
-                <a:schemeClr val="tx1"/>
-              </a:solidFill>
-            </a:endParaRPr>
           </a:p>
         </p:txBody>
       </p:sp>
@@ -3544,7 +3661,7 @@
         </p:nvSpPr>
         <p:spPr>
           <a:xfrm>
-            <a:off x="8826837" y="4294231"/>
+            <a:off x="8826840" y="3758211"/>
             <a:ext cx="271849" cy="288324"/>
           </a:xfrm>
           <a:prstGeom prst="rect">
@@ -3571,18 +3688,13 @@
           <a:p>
             <a:pPr algn="ctr"/>
             <a:r>
-              <a:rPr lang="en-US" b="1" dirty="0" smtClean="0">
+              <a:rPr lang="en-US" sz="2400" b="1" dirty="0">
                 <a:solidFill>
                   <a:schemeClr val="tx1"/>
                 </a:solidFill>
               </a:rPr>
               <a:t>4</a:t>
             </a:r>
-            <a:endParaRPr lang="en-US" b="1" dirty="0">
-              <a:solidFill>
-                <a:schemeClr val="tx1"/>
-              </a:solidFill>
-            </a:endParaRPr>
           </a:p>
         </p:txBody>
       </p:sp>
@@ -3594,12 +3706,15 @@
         </p:nvSpPr>
         <p:spPr>
           <a:xfrm>
-            <a:off x="2952691" y="5035637"/>
+            <a:off x="2952694" y="4499620"/>
             <a:ext cx="434505" cy="466531"/>
           </a:xfrm>
           <a:prstGeom prst="roundRect">
             <a:avLst/>
           </a:prstGeom>
+          <a:solidFill>
+            <a:schemeClr val="accent1"/>
+          </a:solidFill>
         </p:spPr>
         <p:style>
           <a:lnRef idx="2">
@@ -3621,18 +3736,13 @@
           <a:p>
             <a:pPr algn="ctr"/>
             <a:r>
-              <a:rPr lang="en-US" sz="1400" b="1" dirty="0" smtClean="0">
+              <a:rPr lang="en-US" b="1" dirty="0">
                 <a:solidFill>
                   <a:schemeClr val="tx1"/>
                 </a:solidFill>
               </a:rPr>
               <a:t>H1</a:t>
             </a:r>
-            <a:endParaRPr lang="en-US" sz="1400" b="1" dirty="0">
-              <a:solidFill>
-                <a:schemeClr val="tx1"/>
-              </a:solidFill>
-            </a:endParaRPr>
           </a:p>
         </p:txBody>
       </p:sp>
@@ -3644,12 +3754,15 @@
         </p:nvSpPr>
         <p:spPr>
           <a:xfrm>
-            <a:off x="3463773" y="5035637"/>
+            <a:off x="3463776" y="4499620"/>
             <a:ext cx="434505" cy="466531"/>
           </a:xfrm>
           <a:prstGeom prst="roundRect">
             <a:avLst/>
           </a:prstGeom>
+          <a:solidFill>
+            <a:schemeClr val="accent2"/>
+          </a:solidFill>
         </p:spPr>
         <p:style>
           <a:lnRef idx="2">
@@ -3671,18 +3784,13 @@
           <a:p>
             <a:pPr algn="ctr"/>
             <a:r>
-              <a:rPr lang="en-US" sz="1400" b="1" dirty="0" smtClean="0">
+              <a:rPr lang="en-US" b="1" dirty="0">
                 <a:solidFill>
                   <a:schemeClr val="tx1"/>
                 </a:solidFill>
               </a:rPr>
               <a:t>H2</a:t>
             </a:r>
-            <a:endParaRPr lang="en-US" sz="1400" b="1" dirty="0">
-              <a:solidFill>
-                <a:schemeClr val="tx1"/>
-              </a:solidFill>
-            </a:endParaRPr>
           </a:p>
         </p:txBody>
       </p:sp>
@@ -3696,7 +3804,7 @@
         </p:nvCxnSpPr>
         <p:spPr>
           <a:xfrm>
-            <a:off x="3169943" y="4582555"/>
+            <a:off x="3169946" y="4046535"/>
             <a:ext cx="1" cy="453082"/>
           </a:xfrm>
           <a:prstGeom prst="line">
@@ -3726,7 +3834,7 @@
         </p:nvCxnSpPr>
         <p:spPr>
           <a:xfrm>
-            <a:off x="3677682" y="4582555"/>
+            <a:off x="3677685" y="4046535"/>
             <a:ext cx="1" cy="453082"/>
           </a:xfrm>
           <a:prstGeom prst="line">
@@ -3756,7 +3864,7 @@
         </p:nvCxnSpPr>
         <p:spPr>
           <a:xfrm>
-            <a:off x="4169761" y="4582555"/>
+            <a:off x="4169764" y="4046535"/>
             <a:ext cx="1" cy="453082"/>
           </a:xfrm>
           <a:prstGeom prst="line">
@@ -3786,7 +3894,7 @@
         </p:nvCxnSpPr>
         <p:spPr>
           <a:xfrm>
-            <a:off x="4703385" y="4582553"/>
+            <a:off x="4703388" y="4046533"/>
             <a:ext cx="1" cy="453082"/>
           </a:xfrm>
           <a:prstGeom prst="line">
@@ -3816,12 +3924,17 @@
         </p:nvSpPr>
         <p:spPr>
           <a:xfrm>
-            <a:off x="7218762" y="5035635"/>
+            <a:off x="7218765" y="4499618"/>
             <a:ext cx="434505" cy="466531"/>
           </a:xfrm>
           <a:prstGeom prst="roundRect">
             <a:avLst/>
           </a:prstGeom>
+          <a:solidFill>
+            <a:schemeClr val="bg1">
+              <a:lumMod val="65000"/>
+            </a:schemeClr>
+          </a:solidFill>
         </p:spPr>
         <p:style>
           <a:lnRef idx="2">
@@ -3843,18 +3956,13 @@
           <a:p>
             <a:pPr algn="ctr"/>
             <a:r>
-              <a:rPr lang="en-US" sz="1400" b="1" dirty="0" smtClean="0">
+              <a:rPr lang="en-US" b="1" dirty="0">
                 <a:solidFill>
                   <a:schemeClr val="tx1"/>
                 </a:solidFill>
               </a:rPr>
               <a:t>H5</a:t>
             </a:r>
-            <a:endParaRPr lang="en-US" sz="1400" b="1" dirty="0">
-              <a:solidFill>
-                <a:schemeClr val="tx1"/>
-              </a:solidFill>
-            </a:endParaRPr>
           </a:p>
         </p:txBody>
       </p:sp>
@@ -3866,7 +3974,7 @@
         </p:nvSpPr>
         <p:spPr>
           <a:xfrm>
-            <a:off x="7725178" y="5035635"/>
+            <a:off x="7725181" y="4499618"/>
             <a:ext cx="434505" cy="466531"/>
           </a:xfrm>
           <a:prstGeom prst="roundRect">
@@ -3893,18 +4001,13 @@
           <a:p>
             <a:pPr algn="ctr"/>
             <a:r>
-              <a:rPr lang="en-US" sz="1400" b="1" dirty="0" smtClean="0">
+              <a:rPr lang="en-US" b="1" dirty="0">
                 <a:solidFill>
                   <a:schemeClr val="tx1"/>
                 </a:solidFill>
               </a:rPr>
               <a:t>H6</a:t>
             </a:r>
-            <a:endParaRPr lang="en-US" sz="1400" b="1" dirty="0">
-              <a:solidFill>
-                <a:schemeClr val="tx1"/>
-              </a:solidFill>
-            </a:endParaRPr>
           </a:p>
         </p:txBody>
       </p:sp>
@@ -3918,7 +4021,7 @@
         </p:nvCxnSpPr>
         <p:spPr>
           <a:xfrm>
-            <a:off x="7436014" y="4582553"/>
+            <a:off x="7436017" y="4046533"/>
             <a:ext cx="1" cy="453082"/>
           </a:xfrm>
           <a:prstGeom prst="line">
@@ -3948,7 +4051,7 @@
         </p:nvCxnSpPr>
         <p:spPr>
           <a:xfrm>
-            <a:off x="7939087" y="4582553"/>
+            <a:off x="7939090" y="4046533"/>
             <a:ext cx="1" cy="453082"/>
           </a:xfrm>
           <a:prstGeom prst="line">
@@ -3978,7 +4081,7 @@
         </p:nvCxnSpPr>
         <p:spPr>
           <a:xfrm>
-            <a:off x="8450169" y="4582553"/>
+            <a:off x="8450172" y="4046533"/>
             <a:ext cx="1" cy="453082"/>
           </a:xfrm>
           <a:prstGeom prst="line">
@@ -4008,7 +4111,7 @@
         </p:nvCxnSpPr>
         <p:spPr>
           <a:xfrm>
-            <a:off x="8976665" y="4582552"/>
+            <a:off x="8976668" y="4046532"/>
             <a:ext cx="1" cy="453082"/>
           </a:xfrm>
           <a:prstGeom prst="line">
@@ -4038,8 +4141,8 @@
         </p:nvSpPr>
         <p:spPr>
           <a:xfrm>
-            <a:off x="3561560" y="3924898"/>
-            <a:ext cx="1056379" cy="369332"/>
+            <a:off x="3449381" y="3294371"/>
+            <a:ext cx="1349537" cy="461665"/>
           </a:xfrm>
           <a:prstGeom prst="rect">
             <a:avLst/>
@@ -4053,10 +4156,9 @@
           <a:lstStyle/>
           <a:p>
             <a:r>
-              <a:rPr lang="en-US" b="1" dirty="0" smtClean="0"/>
+              <a:rPr lang="en-US" sz="2400" b="1" dirty="0"/>
               <a:t>pSwitch1</a:t>
             </a:r>
-            <a:endParaRPr lang="en-US" b="1" dirty="0"/>
           </a:p>
         </p:txBody>
       </p:sp>
@@ -4068,8 +4170,8 @@
         </p:nvSpPr>
         <p:spPr>
           <a:xfrm>
-            <a:off x="7640117" y="3924898"/>
-            <a:ext cx="1056379" cy="369332"/>
+            <a:off x="7460044" y="3309770"/>
+            <a:ext cx="1349537" cy="461665"/>
           </a:xfrm>
           <a:prstGeom prst="rect">
             <a:avLst/>
@@ -4083,10 +4185,9 @@
           <a:lstStyle/>
           <a:p>
             <a:r>
-              <a:rPr lang="en-US" b="1" dirty="0" smtClean="0"/>
+              <a:rPr lang="en-US" sz="2400" b="1" dirty="0"/>
               <a:t>pSwitch2</a:t>
             </a:r>
-            <a:endParaRPr lang="en-US" b="1" dirty="0"/>
           </a:p>
         </p:txBody>
       </p:sp>
@@ -4098,8 +4199,8 @@
         </p:nvSpPr>
         <p:spPr>
           <a:xfrm>
-            <a:off x="5633834" y="3943977"/>
-            <a:ext cx="753732" cy="307777"/>
+            <a:off x="5475392" y="3234519"/>
+            <a:ext cx="1127232" cy="461665"/>
           </a:xfrm>
           <a:prstGeom prst="rect">
             <a:avLst/>
@@ -4113,27 +4214,29 @@
           <a:lstStyle/>
           <a:p>
             <a:r>
-              <a:rPr lang="en-US" sz="1400" b="1" dirty="0"/>
-              <a:t> </a:t>
-            </a:r>
-            <a:r>
-              <a:rPr lang="en-US" sz="1400" b="1" dirty="0" smtClean="0"/>
-              <a:t> CLink1</a:t>
-            </a:r>
-            <a:endParaRPr lang="en-US" sz="1400" b="1" dirty="0"/>
+              <a:rPr lang="en-US" b="1" dirty="0"/>
+              <a:t>  </a:t>
+            </a:r>
+            <a:r>
+              <a:rPr lang="en-US" sz="2400" b="1" dirty="0"/>
+              <a:t>CLink1</a:t>
+            </a:r>
+            <a:endParaRPr lang="en-US" b="1" dirty="0"/>
           </a:p>
         </p:txBody>
       </p:sp>
       <p:cxnSp>
         <p:nvCxnSpPr>
           <p:cNvPr id="41" name="Straight Connector 40"/>
-          <p:cNvCxnSpPr/>
+          <p:cNvCxnSpPr>
+            <a:cxnSpLocks/>
+          </p:cNvCxnSpPr>
           <p:nvPr/>
         </p:nvCxnSpPr>
         <p:spPr>
           <a:xfrm>
-            <a:off x="1143000" y="3248025"/>
-            <a:ext cx="9484567" cy="0"/>
+            <a:off x="0" y="2702674"/>
+            <a:ext cx="12192000" cy="9331"/>
           </a:xfrm>
           <a:prstGeom prst="line">
             <a:avLst/>
@@ -4165,7 +4268,7 @@
         </p:nvSpPr>
         <p:spPr>
           <a:xfrm>
-            <a:off x="6534957" y="567705"/>
+            <a:off x="6534957" y="31685"/>
             <a:ext cx="1100996" cy="513184"/>
           </a:xfrm>
           <a:prstGeom prst="rect">
@@ -4191,7 +4294,7 @@
           <a:lstStyle/>
           <a:p>
             <a:pPr algn="ctr"/>
-            <a:endParaRPr lang="en-US" b="1">
+            <a:endParaRPr lang="en-US" sz="2400" b="1">
               <a:solidFill>
                 <a:schemeClr val="tx1"/>
               </a:solidFill>
@@ -4207,7 +4310,7 @@
         </p:nvSpPr>
         <p:spPr>
           <a:xfrm>
-            <a:off x="9791666" y="567705"/>
+            <a:off x="9791666" y="31685"/>
             <a:ext cx="1100996" cy="513184"/>
           </a:xfrm>
           <a:prstGeom prst="rect">
@@ -4233,7 +4336,7 @@
           <a:lstStyle/>
           <a:p>
             <a:pPr algn="ctr"/>
-            <a:endParaRPr lang="en-US" b="1">
+            <a:endParaRPr lang="en-US" sz="2400" b="1">
               <a:solidFill>
                 <a:schemeClr val="tx1"/>
               </a:solidFill>
@@ -4249,12 +4352,15 @@
         </p:nvSpPr>
         <p:spPr>
           <a:xfrm>
-            <a:off x="5635468" y="591031"/>
+            <a:off x="5635471" y="55012"/>
             <a:ext cx="434505" cy="466531"/>
           </a:xfrm>
           <a:prstGeom prst="roundRect">
             <a:avLst/>
           </a:prstGeom>
+          <a:solidFill>
+            <a:schemeClr val="accent1"/>
+          </a:solidFill>
         </p:spPr>
         <p:style>
           <a:lnRef idx="2">
@@ -4276,18 +4382,13 @@
           <a:p>
             <a:pPr algn="ctr"/>
             <a:r>
-              <a:rPr lang="en-US" sz="1400" b="1" dirty="0" smtClean="0">
+              <a:rPr lang="en-US" b="1" dirty="0">
                 <a:solidFill>
                   <a:schemeClr val="tx1"/>
                 </a:solidFill>
               </a:rPr>
               <a:t>H1</a:t>
             </a:r>
-            <a:endParaRPr lang="en-US" sz="1400" b="1" dirty="0">
-              <a:solidFill>
-                <a:schemeClr val="tx1"/>
-              </a:solidFill>
-            </a:endParaRPr>
           </a:p>
         </p:txBody>
       </p:sp>
@@ -4299,12 +4400,15 @@
         </p:nvSpPr>
         <p:spPr>
           <a:xfrm>
-            <a:off x="11351709" y="591030"/>
+            <a:off x="11351712" y="55011"/>
             <a:ext cx="434505" cy="466531"/>
           </a:xfrm>
           <a:prstGeom prst="roundRect">
             <a:avLst/>
           </a:prstGeom>
+          <a:solidFill>
+            <a:schemeClr val="accent2"/>
+          </a:solidFill>
         </p:spPr>
         <p:style>
           <a:lnRef idx="2">
@@ -4326,18 +4430,13 @@
           <a:p>
             <a:pPr algn="ctr"/>
             <a:r>
-              <a:rPr lang="en-US" sz="1400" b="1" dirty="0" smtClean="0">
+              <a:rPr lang="en-US" b="1" dirty="0">
                 <a:solidFill>
                   <a:schemeClr val="tx1"/>
                 </a:solidFill>
               </a:rPr>
-              <a:t>H5</a:t>
-            </a:r>
-            <a:endParaRPr lang="en-US" sz="1400" b="1" dirty="0">
-              <a:solidFill>
-                <a:schemeClr val="tx1"/>
-              </a:solidFill>
-            </a:endParaRPr>
+              <a:t>H2</a:t>
+            </a:r>
           </a:p>
         </p:txBody>
       </p:sp>
@@ -4352,12 +4451,17 @@
         </p:nvCxnSpPr>
         <p:spPr>
           <a:xfrm>
-            <a:off x="7635953" y="824297"/>
+            <a:off x="7635956" y="288277"/>
             <a:ext cx="2155713" cy="0"/>
           </a:xfrm>
           <a:prstGeom prst="line">
             <a:avLst/>
           </a:prstGeom>
+          <a:ln w="28575">
+            <a:solidFill>
+              <a:srgbClr val="FF0000"/>
+            </a:solidFill>
+          </a:ln>
         </p:spPr>
         <p:style>
           <a:lnRef idx="3">
@@ -4385,7 +4489,7 @@
         </p:nvCxnSpPr>
         <p:spPr>
           <a:xfrm>
-            <a:off x="7085455" y="1080889"/>
+            <a:off x="7085455" y="544869"/>
             <a:ext cx="1070248" cy="752760"/>
           </a:xfrm>
           <a:prstGeom prst="line">
@@ -4418,7 +4522,7 @@
         </p:nvCxnSpPr>
         <p:spPr>
           <a:xfrm flipV="1">
-            <a:off x="9256699" y="1080889"/>
+            <a:off x="9256702" y="544869"/>
             <a:ext cx="1085465" cy="752760"/>
           </a:xfrm>
           <a:prstGeom prst="line">
@@ -4451,7 +4555,7 @@
         </p:nvCxnSpPr>
         <p:spPr>
           <a:xfrm>
-            <a:off x="6069973" y="824297"/>
+            <a:off x="6069973" y="288277"/>
             <a:ext cx="464984" cy="0"/>
           </a:xfrm>
           <a:prstGeom prst="line">
@@ -4484,7 +4588,7 @@
         </p:nvCxnSpPr>
         <p:spPr>
           <a:xfrm flipV="1">
-            <a:off x="10892662" y="824296"/>
+            <a:off x="10892665" y="288279"/>
             <a:ext cx="459047" cy="1"/>
           </a:xfrm>
           <a:prstGeom prst="line">
@@ -4514,12 +4618,15 @@
         </p:nvSpPr>
         <p:spPr>
           <a:xfrm>
-            <a:off x="6534941" y="680133"/>
+            <a:off x="6534941" y="144115"/>
             <a:ext cx="265368" cy="274793"/>
           </a:xfrm>
           <a:prstGeom prst="rect">
             <a:avLst/>
           </a:prstGeom>
+          <a:solidFill>
+            <a:schemeClr val="accent1"/>
+          </a:solidFill>
         </p:spPr>
         <p:style>
           <a:lnRef idx="2">
@@ -4541,7 +4648,7 @@
           <a:p>
             <a:pPr algn="ctr"/>
             <a:r>
-              <a:rPr lang="en-US" sz="1600" b="1" dirty="0" smtClean="0">
+              <a:rPr lang="en-US" sz="2000" b="1" dirty="0">
                 <a:solidFill>
                   <a:schemeClr val="tx1"/>
                 </a:solidFill>
@@ -4559,12 +4666,15 @@
         </p:nvSpPr>
         <p:spPr>
           <a:xfrm>
-            <a:off x="6905279" y="792564"/>
-            <a:ext cx="296169" cy="274793"/>
+            <a:off x="6937510" y="314209"/>
+            <a:ext cx="260260" cy="239761"/>
           </a:xfrm>
           <a:prstGeom prst="rect">
             <a:avLst/>
           </a:prstGeom>
+          <a:solidFill>
+            <a:schemeClr val="accent1"/>
+          </a:solidFill>
         </p:spPr>
         <p:style>
           <a:lnRef idx="2">
@@ -4586,18 +4696,13 @@
           <a:p>
             <a:pPr algn="ctr"/>
             <a:r>
-              <a:rPr lang="en-US" b="1" dirty="0" smtClean="0">
+              <a:rPr lang="en-US" sz="2400" b="1" dirty="0">
                 <a:solidFill>
                   <a:schemeClr val="tx1"/>
                 </a:solidFill>
               </a:rPr>
               <a:t>2</a:t>
             </a:r>
-            <a:endParaRPr lang="en-US" b="1" dirty="0">
-              <a:solidFill>
-                <a:schemeClr val="tx1"/>
-              </a:solidFill>
-            </a:endParaRPr>
           </a:p>
         </p:txBody>
       </p:sp>
@@ -4609,12 +4714,15 @@
         </p:nvSpPr>
         <p:spPr>
           <a:xfrm>
-            <a:off x="7426030" y="673364"/>
+            <a:off x="7426033" y="137346"/>
             <a:ext cx="209939" cy="274793"/>
           </a:xfrm>
           <a:prstGeom prst="rect">
             <a:avLst/>
           </a:prstGeom>
+          <a:solidFill>
+            <a:schemeClr val="accent1"/>
+          </a:solidFill>
         </p:spPr>
         <p:style>
           <a:lnRef idx="2">
@@ -4636,18 +4744,13 @@
           <a:p>
             <a:pPr algn="ctr"/>
             <a:r>
-              <a:rPr lang="en-US" b="1" dirty="0" smtClean="0">
+              <a:rPr lang="en-US" sz="2400" b="1" dirty="0">
                 <a:solidFill>
                   <a:schemeClr val="tx1"/>
                 </a:solidFill>
               </a:rPr>
               <a:t>3</a:t>
             </a:r>
-            <a:endParaRPr lang="en-US" b="1" dirty="0">
-              <a:solidFill>
-                <a:schemeClr val="tx1"/>
-              </a:solidFill>
-            </a:endParaRPr>
           </a:p>
         </p:txBody>
       </p:sp>
@@ -4659,12 +4762,15 @@
         </p:nvSpPr>
         <p:spPr>
           <a:xfrm>
-            <a:off x="9791650" y="668697"/>
+            <a:off x="9791653" y="132679"/>
             <a:ext cx="209939" cy="274793"/>
           </a:xfrm>
           <a:prstGeom prst="rect">
             <a:avLst/>
           </a:prstGeom>
+          <a:solidFill>
+            <a:schemeClr val="accent2"/>
+          </a:solidFill>
         </p:spPr>
         <p:style>
           <a:lnRef idx="2">
@@ -4686,18 +4792,13 @@
           <a:p>
             <a:pPr algn="ctr"/>
             <a:r>
-              <a:rPr lang="en-US" b="1" dirty="0" smtClean="0">
+              <a:rPr lang="en-US" sz="2400" b="1" dirty="0">
                 <a:solidFill>
                   <a:schemeClr val="tx1"/>
                 </a:solidFill>
               </a:rPr>
               <a:t>2</a:t>
             </a:r>
-            <a:endParaRPr lang="en-US" b="1" dirty="0">
-              <a:solidFill>
-                <a:schemeClr val="tx1"/>
-              </a:solidFill>
-            </a:endParaRPr>
           </a:p>
         </p:txBody>
       </p:sp>
@@ -4709,12 +4810,15 @@
         </p:nvSpPr>
         <p:spPr>
           <a:xfrm>
-            <a:off x="10207432" y="806095"/>
-            <a:ext cx="209939" cy="274793"/>
+            <a:off x="10207435" y="270078"/>
+            <a:ext cx="209939" cy="274794"/>
           </a:xfrm>
           <a:prstGeom prst="rect">
             <a:avLst/>
           </a:prstGeom>
+          <a:solidFill>
+            <a:schemeClr val="accent2"/>
+          </a:solidFill>
         </p:spPr>
         <p:style>
           <a:lnRef idx="2">
@@ -4736,18 +4840,13 @@
           <a:p>
             <a:pPr algn="ctr"/>
             <a:r>
-              <a:rPr lang="en-US" b="1" dirty="0" smtClean="0">
+              <a:rPr lang="en-US" sz="2400" b="1" dirty="0">
                 <a:solidFill>
                   <a:schemeClr val="tx1"/>
                 </a:solidFill>
               </a:rPr>
               <a:t>3</a:t>
             </a:r>
-            <a:endParaRPr lang="en-US" b="1" dirty="0">
-              <a:solidFill>
-                <a:schemeClr val="tx1"/>
-              </a:solidFill>
-            </a:endParaRPr>
           </a:p>
         </p:txBody>
       </p:sp>
@@ -4759,12 +4858,15 @@
         </p:nvSpPr>
         <p:spPr>
           <a:xfrm>
-            <a:off x="10682723" y="668698"/>
+            <a:off x="10682726" y="132680"/>
             <a:ext cx="209939" cy="274793"/>
           </a:xfrm>
           <a:prstGeom prst="rect">
             <a:avLst/>
           </a:prstGeom>
+          <a:solidFill>
+            <a:schemeClr val="accent2"/>
+          </a:solidFill>
         </p:spPr>
         <p:style>
           <a:lnRef idx="2">
@@ -4786,31 +4888,26 @@
           <a:p>
             <a:pPr algn="ctr"/>
             <a:r>
-              <a:rPr lang="en-US" b="1" dirty="0" smtClean="0">
+              <a:rPr lang="en-US" sz="2400" b="1" dirty="0">
                 <a:solidFill>
                   <a:schemeClr val="tx1"/>
                 </a:solidFill>
               </a:rPr>
               <a:t>1</a:t>
             </a:r>
-            <a:endParaRPr lang="en-US" b="1" dirty="0">
-              <a:solidFill>
-                <a:schemeClr val="tx1"/>
-              </a:solidFill>
-            </a:endParaRPr>
-          </a:p>
-        </p:txBody>
-      </p:sp>
-      <p:sp>
-        <p:nvSpPr>
-          <p:cNvPr id="103" name="TextBox 102"/>
+          </a:p>
+        </p:txBody>
+      </p:sp>
+      <p:sp>
+        <p:nvSpPr>
+          <p:cNvPr id="104" name="TextBox 103"/>
           <p:cNvSpPr txBox="1"/>
           <p:nvPr/>
         </p:nvSpPr>
         <p:spPr>
           <a:xfrm>
-            <a:off x="6824896" y="1468181"/>
-            <a:ext cx="992579" cy="307777"/>
+            <a:off x="6096376" y="962050"/>
+            <a:ext cx="1827744" cy="430887"/>
           </a:xfrm>
           <a:prstGeom prst="rect">
             <a:avLst/>
@@ -4824,27 +4921,22 @@
           <a:lstStyle/>
           <a:p>
             <a:r>
-              <a:rPr lang="en-US" sz="1400" b="1" dirty="0"/>
-              <a:t> </a:t>
-            </a:r>
-            <a:r>
-              <a:rPr lang="en-US" sz="1400" b="1" dirty="0" smtClean="0"/>
-              <a:t> loopLink1</a:t>
-            </a:r>
-            <a:endParaRPr lang="en-US" sz="1400" b="1" dirty="0"/>
-          </a:p>
-        </p:txBody>
-      </p:sp>
-      <p:sp>
-        <p:nvSpPr>
-          <p:cNvPr id="104" name="TextBox 103"/>
+              <a:rPr lang="en-US" sz="2200" b="1" dirty="0"/>
+              <a:t>  vL1 -&gt; CLink1</a:t>
+            </a:r>
+          </a:p>
+        </p:txBody>
+      </p:sp>
+      <p:sp>
+        <p:nvSpPr>
+          <p:cNvPr id="105" name="TextBox 104"/>
           <p:cNvSpPr txBox="1"/>
           <p:nvPr/>
         </p:nvSpPr>
         <p:spPr>
           <a:xfrm>
-            <a:off x="8260391" y="530233"/>
-            <a:ext cx="753732" cy="307777"/>
+            <a:off x="9517255" y="962050"/>
+            <a:ext cx="1827744" cy="430887"/>
           </a:xfrm>
           <a:prstGeom prst="rect">
             <a:avLst/>
@@ -4858,48 +4950,9 @@
           <a:lstStyle/>
           <a:p>
             <a:r>
-              <a:rPr lang="en-US" sz="1400" b="1" dirty="0"/>
-              <a:t> </a:t>
-            </a:r>
-            <a:r>
-              <a:rPr lang="en-US" sz="1400" b="1" dirty="0" smtClean="0"/>
-              <a:t> CLink1</a:t>
-            </a:r>
-            <a:endParaRPr lang="en-US" sz="1400" b="1" dirty="0"/>
-          </a:p>
-        </p:txBody>
-      </p:sp>
-      <p:sp>
-        <p:nvSpPr>
-          <p:cNvPr id="105" name="TextBox 104"/>
-          <p:cNvSpPr txBox="1"/>
-          <p:nvPr/>
-        </p:nvSpPr>
-        <p:spPr>
-          <a:xfrm>
-            <a:off x="9628730" y="1383864"/>
-            <a:ext cx="753732" cy="307777"/>
-          </a:xfrm>
-          <a:prstGeom prst="rect">
-            <a:avLst/>
-          </a:prstGeom>
-          <a:noFill/>
-        </p:spPr>
-        <p:txBody>
-          <a:bodyPr wrap="none" rtlCol="0">
-            <a:spAutoFit/>
-          </a:bodyPr>
-          <a:lstStyle/>
-          <a:p>
-            <a:r>
-              <a:rPr lang="en-US" sz="1400" b="1" dirty="0"/>
-              <a:t> </a:t>
-            </a:r>
-            <a:r>
-              <a:rPr lang="en-US" sz="1400" b="1" dirty="0" smtClean="0"/>
-              <a:t> CLink1</a:t>
-            </a:r>
-            <a:endParaRPr lang="en-US" sz="1400" b="1" dirty="0"/>
+              <a:rPr lang="en-US" sz="2200" b="1" dirty="0"/>
+              <a:t>  vL2 -&gt; CLink1</a:t>
+            </a:r>
           </a:p>
         </p:txBody>
       </p:sp>
@@ -4911,7 +4964,7 @@
         </p:nvSpPr>
         <p:spPr>
           <a:xfrm>
-            <a:off x="1171970" y="598822"/>
+            <a:off x="1171973" y="62802"/>
             <a:ext cx="426089" cy="513184"/>
           </a:xfrm>
           <a:prstGeom prst="rect">
@@ -4938,14 +4991,14 @@
           <a:p>
             <a:pPr algn="ctr"/>
             <a:r>
-              <a:rPr lang="en-US" sz="1400" b="1" dirty="0" smtClean="0">
+              <a:rPr lang="en-US" b="1" dirty="0">
                 <a:solidFill>
                   <a:schemeClr val="tx1"/>
                 </a:solidFill>
               </a:rPr>
               <a:t>vS1</a:t>
             </a:r>
-            <a:endParaRPr lang="en-US" sz="1200" b="1" dirty="0">
+            <a:endParaRPr lang="en-US" sz="1600" b="1" dirty="0">
               <a:solidFill>
                 <a:schemeClr val="tx1"/>
               </a:solidFill>
@@ -4961,7 +5014,7 @@
         </p:nvSpPr>
         <p:spPr>
           <a:xfrm>
-            <a:off x="3399209" y="567705"/>
+            <a:off x="3399212" y="31685"/>
             <a:ext cx="403753" cy="513184"/>
           </a:xfrm>
           <a:prstGeom prst="rect">
@@ -4988,14 +5041,64 @@
           <a:p>
             <a:pPr algn="ctr"/>
             <a:r>
-              <a:rPr lang="en-US" sz="1400" b="1" dirty="0" smtClean="0">
+              <a:rPr lang="en-US" b="1" dirty="0">
+                <a:solidFill>
+                  <a:schemeClr val="tx1"/>
+                </a:solidFill>
+              </a:rPr>
+              <a:t>vS2</a:t>
+            </a:r>
+            <a:endParaRPr lang="en-US" sz="1600" b="1" dirty="0">
+              <a:solidFill>
+                <a:schemeClr val="tx1"/>
+              </a:solidFill>
+            </a:endParaRPr>
+          </a:p>
+        </p:txBody>
+      </p:sp>
+      <p:sp>
+        <p:nvSpPr>
+          <p:cNvPr id="108" name="Rectangle 107"/>
+          <p:cNvSpPr/>
+          <p:nvPr/>
+        </p:nvSpPr>
+        <p:spPr>
+          <a:xfrm>
+            <a:off x="2275375" y="1147386"/>
+            <a:ext cx="406188" cy="513184"/>
+          </a:xfrm>
+          <a:prstGeom prst="rect">
+            <a:avLst/>
+          </a:prstGeom>
+        </p:spPr>
+        <p:style>
+          <a:lnRef idx="2">
+            <a:schemeClr val="dk1"/>
+          </a:lnRef>
+          <a:fillRef idx="1">
+            <a:schemeClr val="lt1"/>
+          </a:fillRef>
+          <a:effectRef idx="0">
+            <a:schemeClr val="dk1"/>
+          </a:effectRef>
+          <a:fontRef idx="minor">
+            <a:schemeClr val="dk1"/>
+          </a:fontRef>
+        </p:style>
+        <p:txBody>
+          <a:bodyPr rtlCol="0" anchor="ctr"/>
+          <a:lstStyle/>
+          <a:p>
+            <a:pPr algn="ctr"/>
+            <a:r>
+              <a:rPr lang="en-US" b="1" dirty="0">
                 <a:solidFill>
                   <a:schemeClr val="tx1"/>
                 </a:solidFill>
               </a:rPr>
               <a:t>vS3</a:t>
             </a:r>
-            <a:endParaRPr lang="en-US" sz="1200" b="1" dirty="0">
+            <a:endParaRPr lang="en-US" sz="1600" b="1" dirty="0">
               <a:solidFill>
                 <a:schemeClr val="tx1"/>
               </a:solidFill>
@@ -5005,16 +5108,16 @@
       </p:sp>
       <p:sp>
         <p:nvSpPr>
-          <p:cNvPr id="108" name="Rectangle 107"/>
+          <p:cNvPr id="109" name="Rounded Rectangle 108"/>
           <p:cNvSpPr/>
           <p:nvPr/>
         </p:nvSpPr>
         <p:spPr>
           <a:xfrm>
-            <a:off x="2275375" y="1683406"/>
-            <a:ext cx="406188" cy="513184"/>
-          </a:xfrm>
-          <a:prstGeom prst="rect">
+            <a:off x="272484" y="86130"/>
+            <a:ext cx="434505" cy="466531"/>
+          </a:xfrm>
+          <a:prstGeom prst="roundRect">
             <a:avLst/>
           </a:prstGeom>
         </p:spPr>
@@ -5038,30 +5141,25 @@
           <a:p>
             <a:pPr algn="ctr"/>
             <a:r>
-              <a:rPr lang="en-US" sz="1400" b="1" dirty="0" smtClean="0">
+              <a:rPr lang="en-US" b="1" dirty="0">
                 <a:solidFill>
                   <a:schemeClr val="tx1"/>
                 </a:solidFill>
               </a:rPr>
-              <a:t>vS2</a:t>
-            </a:r>
-            <a:endParaRPr lang="en-US" sz="1200" b="1" dirty="0">
-              <a:solidFill>
-                <a:schemeClr val="tx1"/>
-              </a:solidFill>
-            </a:endParaRPr>
-          </a:p>
-        </p:txBody>
-      </p:sp>
-      <p:sp>
-        <p:nvSpPr>
-          <p:cNvPr id="109" name="Rounded Rectangle 108"/>
+              <a:t>H</a:t>
+            </a:r>
+          </a:p>
+        </p:txBody>
+      </p:sp>
+      <p:sp>
+        <p:nvSpPr>
+          <p:cNvPr id="110" name="Rounded Rectangle 109"/>
           <p:cNvSpPr/>
           <p:nvPr/>
         </p:nvSpPr>
         <p:spPr>
           <a:xfrm>
-            <a:off x="272481" y="622148"/>
+            <a:off x="2261219" y="1988885"/>
             <a:ext cx="434505" cy="466531"/>
           </a:xfrm>
           <a:prstGeom prst="roundRect">
@@ -5088,7 +5186,7 @@
           <a:p>
             <a:pPr algn="ctr"/>
             <a:r>
-              <a:rPr lang="en-US" sz="1400" b="1" dirty="0">
+              <a:rPr lang="en-US" b="1" dirty="0">
                 <a:solidFill>
                   <a:schemeClr val="tx1"/>
                 </a:solidFill>
@@ -5100,14 +5198,14 @@
       </p:sp>
       <p:sp>
         <p:nvSpPr>
-          <p:cNvPr id="110" name="Rounded Rectangle 109"/>
+          <p:cNvPr id="111" name="Rounded Rectangle 110"/>
           <p:cNvSpPr/>
           <p:nvPr/>
         </p:nvSpPr>
         <p:spPr>
           <a:xfrm>
-            <a:off x="2261216" y="2524902"/>
-            <a:ext cx="434505" cy="466531"/>
+            <a:off x="4132475" y="86129"/>
+            <a:ext cx="441477" cy="466531"/>
           </a:xfrm>
           <a:prstGeom prst="roundRect">
             <a:avLst/>
@@ -5133,68 +5231,13 @@
           <a:p>
             <a:pPr algn="ctr"/>
             <a:r>
-              <a:rPr lang="en-US" sz="1400" b="1" dirty="0" smtClean="0">
+              <a:rPr lang="en-US" b="1" dirty="0">
                 <a:solidFill>
                   <a:schemeClr val="tx1"/>
                 </a:solidFill>
               </a:rPr>
               <a:t>H</a:t>
             </a:r>
-            <a:endParaRPr lang="en-US" sz="1400" b="1" dirty="0">
-              <a:solidFill>
-                <a:schemeClr val="tx1"/>
-              </a:solidFill>
-            </a:endParaRPr>
-          </a:p>
-        </p:txBody>
-      </p:sp>
-      <p:sp>
-        <p:nvSpPr>
-          <p:cNvPr id="111" name="Rounded Rectangle 110"/>
-          <p:cNvSpPr/>
-          <p:nvPr/>
-        </p:nvSpPr>
-        <p:spPr>
-          <a:xfrm>
-            <a:off x="4132472" y="622147"/>
-            <a:ext cx="441477" cy="466531"/>
-          </a:xfrm>
-          <a:prstGeom prst="roundRect">
-            <a:avLst/>
-          </a:prstGeom>
-        </p:spPr>
-        <p:style>
-          <a:lnRef idx="2">
-            <a:schemeClr val="dk1"/>
-          </a:lnRef>
-          <a:fillRef idx="1">
-            <a:schemeClr val="lt1"/>
-          </a:fillRef>
-          <a:effectRef idx="0">
-            <a:schemeClr val="dk1"/>
-          </a:effectRef>
-          <a:fontRef idx="minor">
-            <a:schemeClr val="dk1"/>
-          </a:fontRef>
-        </p:style>
-        <p:txBody>
-          <a:bodyPr rtlCol="0" anchor="ctr"/>
-          <a:lstStyle/>
-          <a:p>
-            <a:pPr algn="ctr"/>
-            <a:r>
-              <a:rPr lang="en-US" sz="1400" b="1" dirty="0" smtClean="0">
-                <a:solidFill>
-                  <a:schemeClr val="tx1"/>
-                </a:solidFill>
-              </a:rPr>
-              <a:t>H</a:t>
-            </a:r>
-            <a:endParaRPr lang="en-US" sz="1400" b="1" dirty="0">
-              <a:solidFill>
-                <a:schemeClr val="tx1"/>
-              </a:solidFill>
-            </a:endParaRPr>
           </a:p>
         </p:txBody>
       </p:sp>
@@ -5208,7 +5251,7 @@
         </p:nvCxnSpPr>
         <p:spPr>
           <a:xfrm flipV="1">
-            <a:off x="1598059" y="855413"/>
+            <a:off x="1598062" y="319396"/>
             <a:ext cx="1789137" cy="1"/>
           </a:xfrm>
           <a:prstGeom prst="line">
@@ -5241,7 +5284,7 @@
         </p:nvCxnSpPr>
         <p:spPr>
           <a:xfrm>
-            <a:off x="1385015" y="1112006"/>
+            <a:off x="1385015" y="575986"/>
             <a:ext cx="890360" cy="827992"/>
           </a:xfrm>
           <a:prstGeom prst="line">
@@ -5274,7 +5317,7 @@
         </p:nvCxnSpPr>
         <p:spPr>
           <a:xfrm flipV="1">
-            <a:off x="2681563" y="1080889"/>
+            <a:off x="2681566" y="544872"/>
             <a:ext cx="919523" cy="859109"/>
           </a:xfrm>
           <a:prstGeom prst="line">
@@ -5307,7 +5350,7 @@
         </p:nvCxnSpPr>
         <p:spPr>
           <a:xfrm>
-            <a:off x="706986" y="855414"/>
+            <a:off x="706986" y="319394"/>
             <a:ext cx="464984" cy="0"/>
           </a:xfrm>
           <a:prstGeom prst="line">
@@ -5339,7 +5382,7 @@
         </p:nvCxnSpPr>
         <p:spPr>
           <a:xfrm flipV="1">
-            <a:off x="3802962" y="824295"/>
+            <a:off x="3802962" y="288275"/>
             <a:ext cx="355222" cy="2"/>
           </a:xfrm>
           <a:prstGeom prst="line">
@@ -5372,7 +5415,7 @@
         </p:nvCxnSpPr>
         <p:spPr>
           <a:xfrm flipV="1">
-            <a:off x="2478469" y="2196590"/>
+            <a:off x="2478469" y="1660570"/>
             <a:ext cx="0" cy="328312"/>
           </a:xfrm>
           <a:prstGeom prst="line">
@@ -5402,7 +5445,7 @@
         </p:nvSpPr>
         <p:spPr>
           <a:xfrm>
-            <a:off x="4590541" y="1492341"/>
+            <a:off x="4590544" y="956321"/>
             <a:ext cx="1133359" cy="398600"/>
           </a:xfrm>
           <a:prstGeom prst="rightArrow">
@@ -5430,7 +5473,7 @@
           <a:lstStyle/>
           <a:p>
             <a:pPr algn="ctr"/>
-            <a:endParaRPr lang="en-US" b="1">
+            <a:endParaRPr lang="en-US" sz="2400" b="1">
               <a:solidFill>
                 <a:schemeClr val="tx1"/>
               </a:solidFill>
@@ -5442,19 +5485,24 @@
         <p:nvCxnSpPr>
           <p:cNvPr id="157" name="Straight Arrow Connector 156"/>
           <p:cNvCxnSpPr>
+            <a:cxnSpLocks/>
             <a:stCxn id="14" idx="0"/>
+            <a:endCxn id="65" idx="3"/>
           </p:cNvCxnSpPr>
           <p:nvPr/>
         </p:nvCxnSpPr>
         <p:spPr>
           <a:xfrm flipV="1">
-            <a:off x="4185427" y="1057561"/>
-            <a:ext cx="2766020" cy="3236670"/>
+            <a:off x="4185427" y="274741"/>
+            <a:ext cx="3450542" cy="3483470"/>
           </a:xfrm>
           <a:prstGeom prst="straightConnector1">
             <a:avLst/>
           </a:prstGeom>
-          <a:ln>
+          <a:ln w="19050">
+            <a:solidFill>
+              <a:srgbClr val="FF0000"/>
+            </a:solidFill>
             <a:prstDash val="dashDot"/>
             <a:tailEnd type="triangle"/>
           </a:ln>
@@ -5474,136 +5522,20 @@
           </a:fontRef>
         </p:style>
       </p:cxnSp>
-      <p:cxnSp>
-        <p:nvCxnSpPr>
-          <p:cNvPr id="159" name="Straight Arrow Connector 158"/>
-          <p:cNvCxnSpPr>
-            <a:stCxn id="8" idx="0"/>
-          </p:cNvCxnSpPr>
-          <p:nvPr/>
-        </p:nvCxnSpPr>
-        <p:spPr>
-          <a:xfrm flipV="1">
-            <a:off x="5200908" y="968460"/>
-            <a:ext cx="2305325" cy="3095111"/>
-          </a:xfrm>
-          <a:prstGeom prst="straightConnector1">
-            <a:avLst/>
-          </a:prstGeom>
-          <a:ln>
-            <a:prstDash val="dashDot"/>
-            <a:tailEnd type="triangle"/>
-          </a:ln>
-        </p:spPr>
-        <p:style>
-          <a:lnRef idx="1">
-            <a:schemeClr val="dk1"/>
-          </a:lnRef>
-          <a:fillRef idx="0">
-            <a:schemeClr val="dk1"/>
-          </a:fillRef>
-          <a:effectRef idx="0">
-            <a:schemeClr val="dk1"/>
-          </a:effectRef>
-          <a:fontRef idx="minor">
-            <a:schemeClr val="tx1"/>
-          </a:fontRef>
-        </p:style>
-      </p:cxnSp>
-      <p:cxnSp>
-        <p:nvCxnSpPr>
-          <p:cNvPr id="161" name="Straight Arrow Connector 160"/>
-          <p:cNvCxnSpPr>
-            <a:stCxn id="15" idx="0"/>
-            <a:endCxn id="66" idx="1"/>
-          </p:cNvCxnSpPr>
-          <p:nvPr/>
-        </p:nvCxnSpPr>
-        <p:spPr>
-          <a:xfrm flipV="1">
-            <a:off x="4696508" y="1816803"/>
-            <a:ext cx="3458914" cy="2477428"/>
-          </a:xfrm>
-          <a:prstGeom prst="straightConnector1">
-            <a:avLst/>
-          </a:prstGeom>
-          <a:ln>
-            <a:prstDash val="dashDot"/>
-            <a:tailEnd type="triangle"/>
-          </a:ln>
-        </p:spPr>
-        <p:style>
-          <a:lnRef idx="1">
-            <a:schemeClr val="dk1"/>
-          </a:lnRef>
-          <a:fillRef idx="0">
-            <a:schemeClr val="dk1"/>
-          </a:fillRef>
-          <a:effectRef idx="0">
-            <a:schemeClr val="dk1"/>
-          </a:effectRef>
-          <a:fontRef idx="minor">
-            <a:schemeClr val="tx1"/>
-          </a:fontRef>
-        </p:style>
-      </p:cxnSp>
-      <p:cxnSp>
-        <p:nvCxnSpPr>
-          <p:cNvPr id="163" name="Straight Arrow Connector 162"/>
-          <p:cNvCxnSpPr>
-            <a:stCxn id="9" idx="0"/>
-            <a:endCxn id="69" idx="1"/>
-          </p:cNvCxnSpPr>
-          <p:nvPr/>
-        </p:nvCxnSpPr>
-        <p:spPr>
-          <a:xfrm flipV="1">
-            <a:off x="6951448" y="806094"/>
-            <a:ext cx="2840202" cy="3257477"/>
-          </a:xfrm>
-          <a:prstGeom prst="straightConnector1">
-            <a:avLst/>
-          </a:prstGeom>
-          <a:ln>
-            <a:prstDash val="dashDot"/>
-            <a:tailEnd type="triangle"/>
-          </a:ln>
-        </p:spPr>
-        <p:style>
-          <a:lnRef idx="1">
-            <a:schemeClr val="dk1"/>
-          </a:lnRef>
-          <a:fillRef idx="0">
-            <a:schemeClr val="dk1"/>
-          </a:fillRef>
-          <a:effectRef idx="0">
-            <a:schemeClr val="dk1"/>
-          </a:effectRef>
-          <a:fontRef idx="minor">
-            <a:schemeClr val="tx1"/>
-          </a:fontRef>
-        </p:style>
-      </p:cxnSp>
-      <p:cxnSp>
-        <p:nvCxnSpPr>
-          <p:cNvPr id="165" name="Straight Arrow Connector 164"/>
-          <p:cNvCxnSpPr>
-            <a:stCxn id="9" idx="0"/>
-            <a:endCxn id="44" idx="2"/>
-          </p:cNvCxnSpPr>
-          <p:nvPr/>
-        </p:nvCxnSpPr>
-        <p:spPr>
-          <a:xfrm flipV="1">
-            <a:off x="6951448" y="1080889"/>
-            <a:ext cx="3390716" cy="2982682"/>
-          </a:xfrm>
-          <a:prstGeom prst="straightConnector1">
-            <a:avLst/>
-          </a:prstGeom>
-          <a:ln>
-            <a:tailEnd type="triangle"/>
-          </a:ln>
+      <p:sp>
+        <p:nvSpPr>
+          <p:cNvPr id="45" name="Rectangle 44"/>
+          <p:cNvSpPr/>
+          <p:nvPr/>
+        </p:nvSpPr>
+        <p:spPr>
+          <a:xfrm>
+            <a:off x="8155703" y="1041037"/>
+            <a:ext cx="1100996" cy="513184"/>
+          </a:xfrm>
+          <a:prstGeom prst="rect">
+            <a:avLst/>
+          </a:prstGeom>
         </p:spPr>
         <p:style>
           <a:lnRef idx="2">
@@ -5619,21 +5551,38 @@
             <a:schemeClr val="dk1"/>
           </a:fontRef>
         </p:style>
-      </p:cxnSp>
-      <p:sp>
-        <p:nvSpPr>
-          <p:cNvPr id="45" name="Rectangle 44"/>
+        <p:txBody>
+          <a:bodyPr rtlCol="0" anchor="ctr"/>
+          <a:lstStyle/>
+          <a:p>
+            <a:pPr algn="ctr"/>
+            <a:endParaRPr lang="en-US" sz="2400" b="1">
+              <a:solidFill>
+                <a:schemeClr val="tx1"/>
+              </a:solidFill>
+            </a:endParaRPr>
+          </a:p>
+        </p:txBody>
+      </p:sp>
+      <p:sp>
+        <p:nvSpPr>
+          <p:cNvPr id="47" name="Rounded Rectangle 46"/>
           <p:cNvSpPr/>
           <p:nvPr/>
         </p:nvSpPr>
         <p:spPr>
           <a:xfrm>
-            <a:off x="8155703" y="1577057"/>
-            <a:ext cx="1100996" cy="513184"/>
-          </a:xfrm>
-          <a:prstGeom prst="rect">
-            <a:avLst/>
-          </a:prstGeom>
+            <a:off x="8488951" y="1795325"/>
+            <a:ext cx="434505" cy="466531"/>
+          </a:xfrm>
+          <a:prstGeom prst="roundRect">
+            <a:avLst/>
+          </a:prstGeom>
+          <a:solidFill>
+            <a:schemeClr val="bg1">
+              <a:lumMod val="65000"/>
+            </a:schemeClr>
+          </a:solidFill>
         </p:spPr>
         <p:style>
           <a:lnRef idx="2">
@@ -5654,61 +5603,14 @@
           <a:lstStyle/>
           <a:p>
             <a:pPr algn="ctr"/>
-            <a:endParaRPr lang="en-US" b="1">
-              <a:solidFill>
-                <a:schemeClr val="tx1"/>
-              </a:solidFill>
-            </a:endParaRPr>
-          </a:p>
-        </p:txBody>
-      </p:sp>
-      <p:sp>
-        <p:nvSpPr>
-          <p:cNvPr id="47" name="Rounded Rectangle 46"/>
-          <p:cNvSpPr/>
-          <p:nvPr/>
-        </p:nvSpPr>
-        <p:spPr>
-          <a:xfrm>
-            <a:off x="8488948" y="2331342"/>
-            <a:ext cx="434505" cy="466531"/>
-          </a:xfrm>
-          <a:prstGeom prst="roundRect">
-            <a:avLst/>
-          </a:prstGeom>
-        </p:spPr>
-        <p:style>
-          <a:lnRef idx="2">
-            <a:schemeClr val="dk1"/>
-          </a:lnRef>
-          <a:fillRef idx="1">
-            <a:schemeClr val="lt1"/>
-          </a:fillRef>
-          <a:effectRef idx="0">
-            <a:schemeClr val="dk1"/>
-          </a:effectRef>
-          <a:fontRef idx="minor">
-            <a:schemeClr val="dk1"/>
-          </a:fontRef>
-        </p:style>
-        <p:txBody>
-          <a:bodyPr rtlCol="0" anchor="ctr"/>
-          <a:lstStyle/>
-          <a:p>
-            <a:pPr algn="ctr"/>
-            <a:r>
-              <a:rPr lang="en-US" sz="1400" b="1" dirty="0" smtClean="0">
+            <a:r>
+              <a:rPr lang="en-US" b="1" dirty="0">
                 <a:solidFill>
                   <a:schemeClr val="tx1"/>
                 </a:solidFill>
               </a:rPr>
-              <a:t>H2</a:t>
-            </a:r>
-            <a:endParaRPr lang="en-US" sz="1400" b="1" dirty="0">
-              <a:solidFill>
-                <a:schemeClr val="tx1"/>
-              </a:solidFill>
-            </a:endParaRPr>
+              <a:t>H5</a:t>
+            </a:r>
           </a:p>
         </p:txBody>
       </p:sp>
@@ -5723,7 +5625,7 @@
         </p:nvCxnSpPr>
         <p:spPr>
           <a:xfrm flipV="1">
-            <a:off x="8706201" y="2090241"/>
+            <a:off x="8706201" y="1554224"/>
             <a:ext cx="0" cy="241101"/>
           </a:xfrm>
           <a:prstGeom prst="line">
@@ -5753,12 +5655,15 @@
         </p:nvSpPr>
         <p:spPr>
           <a:xfrm>
-            <a:off x="8155422" y="1679406"/>
+            <a:off x="8155425" y="1143389"/>
             <a:ext cx="209939" cy="274793"/>
           </a:xfrm>
           <a:prstGeom prst="rect">
             <a:avLst/>
           </a:prstGeom>
+          <a:solidFill>
+            <a:schemeClr val="accent3"/>
+          </a:solidFill>
         </p:spPr>
         <p:style>
           <a:lnRef idx="2">
@@ -5780,18 +5685,13 @@
           <a:p>
             <a:pPr algn="ctr"/>
             <a:r>
-              <a:rPr lang="en-US" b="1" dirty="0" smtClean="0">
+              <a:rPr lang="en-US" sz="2400" b="1" dirty="0">
                 <a:solidFill>
                   <a:schemeClr val="tx1"/>
                 </a:solidFill>
               </a:rPr>
               <a:t>2</a:t>
             </a:r>
-            <a:endParaRPr lang="en-US" b="1" dirty="0">
-              <a:solidFill>
-                <a:schemeClr val="tx1"/>
-              </a:solidFill>
-            </a:endParaRPr>
           </a:p>
         </p:txBody>
       </p:sp>
@@ -5803,12 +5703,15 @@
         </p:nvSpPr>
         <p:spPr>
           <a:xfrm>
-            <a:off x="9047041" y="1681507"/>
+            <a:off x="9047044" y="1145490"/>
             <a:ext cx="209939" cy="274793"/>
           </a:xfrm>
           <a:prstGeom prst="rect">
             <a:avLst/>
           </a:prstGeom>
+          <a:solidFill>
+            <a:schemeClr val="accent3"/>
+          </a:solidFill>
         </p:spPr>
         <p:style>
           <a:lnRef idx="2">
@@ -5830,18 +5733,13 @@
           <a:p>
             <a:pPr algn="ctr"/>
             <a:r>
-              <a:rPr lang="en-US" b="1" dirty="0" smtClean="0">
+              <a:rPr lang="en-US" sz="2400" b="1" dirty="0">
                 <a:solidFill>
                   <a:schemeClr val="tx1"/>
                 </a:solidFill>
               </a:rPr>
               <a:t>3</a:t>
             </a:r>
-            <a:endParaRPr lang="en-US" b="1" dirty="0">
-              <a:solidFill>
-                <a:schemeClr val="tx1"/>
-              </a:solidFill>
-            </a:endParaRPr>
           </a:p>
         </p:txBody>
       </p:sp>
@@ -5853,12 +5751,15 @@
         </p:nvSpPr>
         <p:spPr>
           <a:xfrm>
-            <a:off x="8608839" y="1815448"/>
-            <a:ext cx="209939" cy="274793"/>
+            <a:off x="8608842" y="1294726"/>
+            <a:ext cx="217998" cy="259498"/>
           </a:xfrm>
           <a:prstGeom prst="rect">
             <a:avLst/>
           </a:prstGeom>
+          <a:solidFill>
+            <a:schemeClr val="accent3"/>
+          </a:solidFill>
         </p:spPr>
         <p:style>
           <a:lnRef idx="2">
@@ -5880,57 +5781,16 @@
           <a:p>
             <a:pPr algn="ctr"/>
             <a:r>
-              <a:rPr lang="en-US" b="1" dirty="0" smtClean="0">
+              <a:rPr lang="en-US" sz="2400" b="1" dirty="0">
                 <a:solidFill>
                   <a:schemeClr val="tx1"/>
                 </a:solidFill>
               </a:rPr>
               <a:t>1</a:t>
             </a:r>
-            <a:endParaRPr lang="en-US" b="1" dirty="0">
-              <a:solidFill>
-                <a:schemeClr val="tx1"/>
-              </a:solidFill>
-            </a:endParaRPr>
-          </a:p>
-        </p:txBody>
-      </p:sp>
-      <p:cxnSp>
-        <p:nvCxnSpPr>
-          <p:cNvPr id="167" name="Straight Arrow Connector 166"/>
-          <p:cNvCxnSpPr>
-            <a:stCxn id="8" idx="0"/>
-          </p:cNvCxnSpPr>
-          <p:nvPr/>
-        </p:nvCxnSpPr>
-        <p:spPr>
-          <a:xfrm flipV="1">
-            <a:off x="5200908" y="1939998"/>
-            <a:ext cx="3846133" cy="2123573"/>
-          </a:xfrm>
-          <a:prstGeom prst="straightConnector1">
-            <a:avLst/>
-          </a:prstGeom>
-          <a:ln>
-            <a:prstDash val="dashDot"/>
-            <a:tailEnd type="triangle"/>
-          </a:ln>
-        </p:spPr>
-        <p:style>
-          <a:lnRef idx="1">
-            <a:schemeClr val="dk1"/>
-          </a:lnRef>
-          <a:fillRef idx="0">
-            <a:schemeClr val="dk1"/>
-          </a:fillRef>
-          <a:effectRef idx="0">
-            <a:schemeClr val="dk1"/>
-          </a:effectRef>
-          <a:fontRef idx="minor">
-            <a:schemeClr val="tx1"/>
-          </a:fontRef>
-        </p:style>
-      </p:cxnSp>
+          </a:p>
+        </p:txBody>
+      </p:sp>
       <p:sp>
         <p:nvSpPr>
           <p:cNvPr id="168" name="TextBox 167"/>
@@ -5939,8 +5799,8 @@
         </p:nvSpPr>
         <p:spPr>
           <a:xfrm>
-            <a:off x="94644" y="3585636"/>
-            <a:ext cx="1861728" cy="369332"/>
+            <a:off x="-30263" y="3030671"/>
+            <a:ext cx="2426626" cy="461665"/>
           </a:xfrm>
           <a:prstGeom prst="rect">
             <a:avLst/>
@@ -5954,10 +5814,9 @@
           <a:lstStyle/>
           <a:p>
             <a:r>
-              <a:rPr lang="en-US" b="1" dirty="0" smtClean="0"/>
+              <a:rPr lang="en-US" sz="2400" b="1" dirty="0"/>
               <a:t>Physical Topology</a:t>
             </a:r>
-            <a:endParaRPr lang="en-US" b="1" dirty="0"/>
           </a:p>
         </p:txBody>
       </p:sp>
@@ -5969,8 +5828,8 @@
         </p:nvSpPr>
         <p:spPr>
           <a:xfrm>
-            <a:off x="88788" y="2578151"/>
-            <a:ext cx="1746888" cy="369332"/>
+            <a:off x="-49403" y="2113727"/>
+            <a:ext cx="2274020" cy="461665"/>
           </a:xfrm>
           <a:prstGeom prst="rect">
             <a:avLst/>
@@ -5984,10 +5843,9 @@
           <a:lstStyle/>
           <a:p>
             <a:r>
-              <a:rPr lang="en-US" b="1" dirty="0" smtClean="0"/>
+              <a:rPr lang="en-US" sz="2400" b="1" dirty="0"/>
               <a:t>Virtual Topology</a:t>
             </a:r>
-            <a:endParaRPr lang="en-US" b="1" dirty="0"/>
           </a:p>
         </p:txBody>
       </p:sp>
@@ -5999,8 +5857,8 @@
         </p:nvSpPr>
         <p:spPr>
           <a:xfrm>
-            <a:off x="8148179" y="2930603"/>
-            <a:ext cx="1035861" cy="369332"/>
+            <a:off x="9528602" y="2241009"/>
+            <a:ext cx="1322798" cy="461665"/>
           </a:xfrm>
           <a:prstGeom prst="rect">
             <a:avLst/>
@@ -6014,10 +5872,9 @@
           <a:lstStyle/>
           <a:p>
             <a:r>
-              <a:rPr lang="en-US" b="1" dirty="0" smtClean="0"/>
+              <a:rPr lang="en-US" sz="2400" b="1" dirty="0"/>
               <a:t>Mapping</a:t>
             </a:r>
-            <a:endParaRPr lang="en-US" b="1" dirty="0"/>
           </a:p>
         </p:txBody>
       </p:sp>
@@ -6029,8 +5886,8 @@
         </p:nvSpPr>
         <p:spPr>
           <a:xfrm>
-            <a:off x="6829624" y="508902"/>
-            <a:ext cx="595107" cy="369332"/>
+            <a:off x="6773516" y="-82268"/>
+            <a:ext cx="912290" cy="461665"/>
           </a:xfrm>
           <a:prstGeom prst="rect">
             <a:avLst/>
@@ -6043,10 +5900,9 @@
           <a:lstStyle/>
           <a:p>
             <a:r>
-              <a:rPr lang="en-US" b="1" dirty="0" smtClean="0"/>
+              <a:rPr lang="en-US" sz="2400" b="1" dirty="0"/>
               <a:t>vS1</a:t>
             </a:r>
-            <a:endParaRPr lang="en-US" b="1" dirty="0"/>
           </a:p>
         </p:txBody>
       </p:sp>
@@ -6058,8 +5914,8 @@
         </p:nvSpPr>
         <p:spPr>
           <a:xfrm>
-            <a:off x="8481271" y="1529477"/>
-            <a:ext cx="519694" cy="369332"/>
+            <a:off x="8383966" y="938267"/>
+            <a:ext cx="631904" cy="461665"/>
           </a:xfrm>
           <a:prstGeom prst="rect">
             <a:avLst/>
@@ -6090,10 +5946,9 @@
           <a:lstStyle/>
           <a:p>
             <a:r>
-              <a:rPr lang="en-US" b="1" dirty="0" smtClean="0"/>
-              <a:t>vS2</a:t>
-            </a:r>
-            <a:endParaRPr lang="en-US" b="1" dirty="0"/>
+              <a:rPr lang="en-US" sz="2400" b="1" dirty="0"/>
+              <a:t>vS3</a:t>
+            </a:r>
           </a:p>
         </p:txBody>
       </p:sp>
@@ -6105,8 +5960,8 @@
         </p:nvSpPr>
         <p:spPr>
           <a:xfrm>
-            <a:off x="10087794" y="512237"/>
-            <a:ext cx="519694" cy="369332"/>
+            <a:off x="10012120" y="-86718"/>
+            <a:ext cx="631904" cy="461665"/>
           </a:xfrm>
           <a:prstGeom prst="rect">
             <a:avLst/>
@@ -6119,10 +5974,9 @@
           <a:lstStyle/>
           <a:p>
             <a:r>
-              <a:rPr lang="en-US" b="1" dirty="0" smtClean="0"/>
-              <a:t>vS3</a:t>
-            </a:r>
-            <a:endParaRPr lang="en-US" b="1" dirty="0"/>
+              <a:rPr lang="en-US" sz="2400" b="1" dirty="0"/>
+              <a:t>vS2</a:t>
+            </a:r>
           </a:p>
         </p:txBody>
       </p:sp>
@@ -6134,7 +5988,7 @@
         </p:nvCxnSpPr>
         <p:spPr>
           <a:xfrm>
-            <a:off x="4169761" y="5035634"/>
+            <a:off x="4169761" y="4499614"/>
             <a:ext cx="533624" cy="0"/>
           </a:xfrm>
           <a:prstGeom prst="line">
@@ -6164,7 +6018,7 @@
         </p:nvCxnSpPr>
         <p:spPr>
           <a:xfrm>
-            <a:off x="8450169" y="5035634"/>
+            <a:off x="8450169" y="4499614"/>
             <a:ext cx="526496" cy="0"/>
           </a:xfrm>
           <a:prstGeom prst="line">
@@ -6194,8 +6048,8 @@
         </p:nvSpPr>
         <p:spPr>
           <a:xfrm>
-            <a:off x="3949099" y="5064982"/>
-            <a:ext cx="992579" cy="307777"/>
+            <a:off x="3816954" y="4523626"/>
+            <a:ext cx="1566454" cy="461665"/>
           </a:xfrm>
           <a:prstGeom prst="rect">
             <a:avLst/>
@@ -6209,14 +6063,9 @@
           <a:lstStyle/>
           <a:p>
             <a:r>
-              <a:rPr lang="en-US" sz="1400" b="1" dirty="0"/>
-              <a:t> </a:t>
-            </a:r>
-            <a:r>
-              <a:rPr lang="en-US" sz="1400" b="1" dirty="0" smtClean="0"/>
-              <a:t> loopLink1</a:t>
-            </a:r>
-            <a:endParaRPr lang="en-US" sz="1400" b="1" dirty="0"/>
+              <a:rPr lang="en-US" sz="2400" b="1" dirty="0"/>
+              <a:t>  loopLink1</a:t>
+            </a:r>
           </a:p>
         </p:txBody>
       </p:sp>
@@ -6228,8 +6077,8 @@
         </p:nvSpPr>
         <p:spPr>
           <a:xfrm>
-            <a:off x="8234626" y="5071223"/>
-            <a:ext cx="992579" cy="307777"/>
+            <a:off x="8129270" y="4527014"/>
+            <a:ext cx="1566454" cy="461665"/>
           </a:xfrm>
           <a:prstGeom prst="rect">
             <a:avLst/>
@@ -6243,14 +6092,9 @@
           <a:lstStyle/>
           <a:p>
             <a:r>
-              <a:rPr lang="en-US" sz="1400" b="1" dirty="0"/>
-              <a:t> </a:t>
-            </a:r>
-            <a:r>
-              <a:rPr lang="en-US" sz="1400" b="1" dirty="0" smtClean="0"/>
-              <a:t> loopLink2</a:t>
-            </a:r>
-            <a:endParaRPr lang="en-US" sz="1400" b="1" dirty="0"/>
+              <a:rPr lang="en-US" sz="2400" b="1" dirty="0"/>
+              <a:t>  loopLink2</a:t>
+            </a:r>
           </a:p>
         </p:txBody>
       </p:sp>
@@ -6262,8 +6106,8 @@
         </p:nvSpPr>
         <p:spPr>
           <a:xfrm>
-            <a:off x="2174961" y="528534"/>
-            <a:ext cx="503664" cy="369332"/>
+            <a:off x="2174964" y="-31135"/>
+            <a:ext cx="615874" cy="461665"/>
           </a:xfrm>
           <a:prstGeom prst="rect">
             <a:avLst/>
@@ -6277,10 +6121,9 @@
           <a:lstStyle/>
           <a:p>
             <a:r>
-              <a:rPr lang="en-US" b="1" dirty="0" smtClean="0"/>
-              <a:t>vL1</a:t>
-            </a:r>
-            <a:endParaRPr lang="en-US" b="1" dirty="0"/>
+              <a:rPr lang="en-US" sz="2400" b="1" dirty="0"/>
+              <a:t>vL3</a:t>
+            </a:r>
           </a:p>
         </p:txBody>
       </p:sp>
@@ -6292,8 +6135,8 @@
         </p:nvSpPr>
         <p:spPr>
           <a:xfrm>
-            <a:off x="3097421" y="1416228"/>
-            <a:ext cx="503664" cy="369332"/>
+            <a:off x="3097421" y="880208"/>
+            <a:ext cx="615874" cy="461665"/>
           </a:xfrm>
           <a:prstGeom prst="rect">
             <a:avLst/>
@@ -6307,10 +6150,9 @@
           <a:lstStyle/>
           <a:p>
             <a:r>
-              <a:rPr lang="en-US" b="1" dirty="0" smtClean="0"/>
+              <a:rPr lang="en-US" sz="2400" b="1" dirty="0"/>
               <a:t>vL2</a:t>
             </a:r>
-            <a:endParaRPr lang="en-US" b="1" dirty="0"/>
           </a:p>
         </p:txBody>
       </p:sp>
@@ -6322,8 +6164,8 @@
         </p:nvSpPr>
         <p:spPr>
           <a:xfrm>
-            <a:off x="1370355" y="1475746"/>
-            <a:ext cx="503664" cy="369332"/>
+            <a:off x="1370358" y="939726"/>
+            <a:ext cx="615874" cy="461665"/>
           </a:xfrm>
           <a:prstGeom prst="rect">
             <a:avLst/>
@@ -6337,10 +6179,258 @@
           <a:lstStyle/>
           <a:p>
             <a:r>
-              <a:rPr lang="en-US" b="1" dirty="0" smtClean="0"/>
-              <a:t>vL2</a:t>
-            </a:r>
-            <a:endParaRPr lang="en-US" b="1" dirty="0"/>
+              <a:rPr lang="en-US" sz="2400" b="1" dirty="0"/>
+              <a:t>vL1</a:t>
+            </a:r>
+          </a:p>
+        </p:txBody>
+      </p:sp>
+      <p:cxnSp>
+        <p:nvCxnSpPr>
+          <p:cNvPr id="161" name="Straight Arrow Connector 160"/>
+          <p:cNvCxnSpPr>
+            <a:cxnSpLocks/>
+            <a:stCxn id="15" idx="0"/>
+            <a:endCxn id="69" idx="1"/>
+          </p:cNvCxnSpPr>
+          <p:nvPr/>
+        </p:nvCxnSpPr>
+        <p:spPr>
+          <a:xfrm flipV="1">
+            <a:off x="4696508" y="270077"/>
+            <a:ext cx="5095142" cy="3488137"/>
+          </a:xfrm>
+          <a:prstGeom prst="straightConnector1">
+            <a:avLst/>
+          </a:prstGeom>
+          <a:ln w="19050">
+            <a:solidFill>
+              <a:srgbClr val="FF0000"/>
+            </a:solidFill>
+            <a:prstDash val="dashDot"/>
+            <a:tailEnd type="triangle"/>
+          </a:ln>
+        </p:spPr>
+        <p:style>
+          <a:lnRef idx="1">
+            <a:schemeClr val="dk1"/>
+          </a:lnRef>
+          <a:fillRef idx="0">
+            <a:schemeClr val="dk1"/>
+          </a:fillRef>
+          <a:effectRef idx="0">
+            <a:schemeClr val="dk1"/>
+          </a:effectRef>
+          <a:fontRef idx="minor">
+            <a:schemeClr val="tx1"/>
+          </a:fontRef>
+        </p:style>
+      </p:cxnSp>
+      <p:sp>
+        <p:nvSpPr>
+          <p:cNvPr id="89" name="TextBox 84">
+            <a:extLst>
+              <a:ext uri="{FF2B5EF4-FFF2-40B4-BE49-F238E27FC236}">
+                <a16:creationId xmlns:a16="http://schemas.microsoft.com/office/drawing/2014/main" id="{6BC842DD-5ECF-4320-8723-17EF359E2B14}"/>
+              </a:ext>
+            </a:extLst>
+          </p:cNvPr>
+          <p:cNvSpPr txBox="1"/>
+          <p:nvPr/>
+        </p:nvSpPr>
+        <p:spPr>
+          <a:xfrm>
+            <a:off x="2773600" y="612999"/>
+            <a:ext cx="554960" cy="369332"/>
+          </a:xfrm>
+          <a:prstGeom prst="rect">
+            <a:avLst/>
+          </a:prstGeom>
+          <a:noFill/>
+        </p:spPr>
+        <p:txBody>
+          <a:bodyPr wrap="none" rtlCol="0">
+            <a:spAutoFit/>
+          </a:bodyPr>
+          <a:lstStyle/>
+          <a:p>
+            <a:r>
+              <a:rPr lang="en-US" b="1" dirty="0">
+                <a:solidFill>
+                  <a:sysClr val="windowText" lastClr="000000"/>
+                </a:solidFill>
+              </a:rPr>
+              <a:t>  1G</a:t>
+            </a:r>
+          </a:p>
+        </p:txBody>
+      </p:sp>
+      <p:sp>
+        <p:nvSpPr>
+          <p:cNvPr id="90" name="TextBox 87">
+            <a:extLst>
+              <a:ext uri="{FF2B5EF4-FFF2-40B4-BE49-F238E27FC236}">
+                <a16:creationId xmlns:a16="http://schemas.microsoft.com/office/drawing/2014/main" id="{4688A163-8151-4508-B7A9-B6515D1A7423}"/>
+              </a:ext>
+            </a:extLst>
+          </p:cNvPr>
+          <p:cNvSpPr txBox="1"/>
+          <p:nvPr/>
+        </p:nvSpPr>
+        <p:spPr>
+          <a:xfrm>
+            <a:off x="1515292" y="605096"/>
+            <a:ext cx="554960" cy="369332"/>
+          </a:xfrm>
+          <a:prstGeom prst="rect">
+            <a:avLst/>
+          </a:prstGeom>
+          <a:noFill/>
+        </p:spPr>
+        <p:txBody>
+          <a:bodyPr wrap="none" rtlCol="0">
+            <a:spAutoFit/>
+          </a:bodyPr>
+          <a:lstStyle/>
+          <a:p>
+            <a:r>
+              <a:rPr lang="en-US" b="1" dirty="0">
+                <a:solidFill>
+                  <a:sysClr val="windowText" lastClr="000000"/>
+                </a:solidFill>
+              </a:rPr>
+              <a:t>  1G</a:t>
+            </a:r>
+          </a:p>
+        </p:txBody>
+      </p:sp>
+      <p:sp>
+        <p:nvSpPr>
+          <p:cNvPr id="91" name="TextBox 84">
+            <a:extLst>
+              <a:ext uri="{FF2B5EF4-FFF2-40B4-BE49-F238E27FC236}">
+                <a16:creationId xmlns:a16="http://schemas.microsoft.com/office/drawing/2014/main" id="{FDF660FE-6E8E-4B13-8BCC-29E2F5A43451}"/>
+              </a:ext>
+            </a:extLst>
+          </p:cNvPr>
+          <p:cNvSpPr txBox="1"/>
+          <p:nvPr/>
+        </p:nvSpPr>
+        <p:spPr>
+          <a:xfrm>
+            <a:off x="2185346" y="292294"/>
+            <a:ext cx="554960" cy="369332"/>
+          </a:xfrm>
+          <a:prstGeom prst="rect">
+            <a:avLst/>
+          </a:prstGeom>
+          <a:noFill/>
+        </p:spPr>
+        <p:txBody>
+          <a:bodyPr wrap="none" rtlCol="0">
+            <a:spAutoFit/>
+          </a:bodyPr>
+          <a:lstStyle/>
+          <a:p>
+            <a:r>
+              <a:rPr lang="en-US" b="1" dirty="0">
+                <a:solidFill>
+                  <a:sysClr val="windowText" lastClr="000000"/>
+                </a:solidFill>
+              </a:rPr>
+              <a:t>  1G</a:t>
+            </a:r>
+          </a:p>
+        </p:txBody>
+      </p:sp>
+      <p:sp>
+        <p:nvSpPr>
+          <p:cNvPr id="92" name="TextBox 83">
+            <a:extLst>
+              <a:ext uri="{FF2B5EF4-FFF2-40B4-BE49-F238E27FC236}">
+                <a16:creationId xmlns:a16="http://schemas.microsoft.com/office/drawing/2014/main" id="{5AC9FC96-B235-463B-8E54-5CF557A87856}"/>
+              </a:ext>
+            </a:extLst>
+          </p:cNvPr>
+          <p:cNvSpPr txBox="1"/>
+          <p:nvPr/>
+        </p:nvSpPr>
+        <p:spPr>
+          <a:xfrm>
+            <a:off x="5676720" y="3680796"/>
+            <a:ext cx="713657" cy="400110"/>
+          </a:xfrm>
+          <a:prstGeom prst="rect">
+            <a:avLst/>
+          </a:prstGeom>
+          <a:noFill/>
+        </p:spPr>
+        <p:txBody>
+          <a:bodyPr wrap="none" rtlCol="0">
+            <a:spAutoFit/>
+          </a:bodyPr>
+          <a:lstStyle/>
+          <a:p>
+            <a:r>
+              <a:rPr lang="en-US" b="1" dirty="0">
+                <a:solidFill>
+                  <a:sysClr val="windowText" lastClr="000000"/>
+                </a:solidFill>
+              </a:rPr>
+              <a:t>  </a:t>
+            </a:r>
+            <a:r>
+              <a:rPr lang="en-US" sz="2000" b="1" dirty="0">
+                <a:solidFill>
+                  <a:sysClr val="windowText" lastClr="000000"/>
+                </a:solidFill>
+              </a:rPr>
+              <a:t>10G</a:t>
+            </a:r>
+            <a:endParaRPr lang="en-US" b="1" dirty="0">
+              <a:solidFill>
+                <a:sysClr val="windowText" lastClr="000000"/>
+              </a:solidFill>
+            </a:endParaRPr>
+          </a:p>
+        </p:txBody>
+      </p:sp>
+      <p:sp>
+        <p:nvSpPr>
+          <p:cNvPr id="93" name="TextBox 83">
+            <a:extLst>
+              <a:ext uri="{FF2B5EF4-FFF2-40B4-BE49-F238E27FC236}">
+                <a16:creationId xmlns:a16="http://schemas.microsoft.com/office/drawing/2014/main" id="{814E947E-2AD0-45C1-B4B5-D1AD6DFA5178}"/>
+              </a:ext>
+            </a:extLst>
+          </p:cNvPr>
+          <p:cNvSpPr txBox="1"/>
+          <p:nvPr/>
+        </p:nvSpPr>
+        <p:spPr>
+          <a:xfrm>
+            <a:off x="4125634" y="4187878"/>
+            <a:ext cx="554960" cy="369332"/>
+          </a:xfrm>
+          <a:prstGeom prst="rect">
+            <a:avLst/>
+          </a:prstGeom>
+          <a:noFill/>
+        </p:spPr>
+        <p:txBody>
+          <a:bodyPr wrap="none" rtlCol="0">
+            <a:spAutoFit/>
+          </a:bodyPr>
+          <a:lstStyle/>
+          <a:p>
+            <a:r>
+              <a:rPr lang="en-US" b="1" dirty="0">
+                <a:solidFill>
+                  <a:sysClr val="windowText" lastClr="000000"/>
+                </a:solidFill>
+              </a:rPr>
+              <a:t>  1G</a:t>
+            </a:r>
           </a:p>
         </p:txBody>
       </p:sp>
@@ -6360,7 +6450,7 @@
 <file path=ppt/theme/theme1.xml><?xml version="1.0" encoding="utf-8"?>
 <a:theme xmlns:a="http://schemas.openxmlformats.org/drawingml/2006/main" name="Office Theme">
   <a:themeElements>
-    <a:clrScheme name="Office">
+    <a:clrScheme name="Office Theme">
       <a:dk1>
         <a:sysClr val="windowText" lastClr="000000"/>
       </a:dk1>
@@ -6374,7 +6464,7 @@
         <a:srgbClr val="E7E6E6"/>
       </a:lt2>
       <a:accent1>
-        <a:srgbClr val="5B9BD5"/>
+        <a:srgbClr val="4472C4"/>
       </a:accent1>
       <a:accent2>
         <a:srgbClr val="ED7D31"/>
@@ -6386,7 +6476,7 @@
         <a:srgbClr val="FFC000"/>
       </a:accent4>
       <a:accent5>
-        <a:srgbClr val="4472C4"/>
+        <a:srgbClr val="5B9BD5"/>
       </a:accent5>
       <a:accent6>
         <a:srgbClr val="70AD47"/>
@@ -6398,14 +6488,14 @@
         <a:srgbClr val="954F72"/>
       </a:folHlink>
     </a:clrScheme>
-    <a:fontScheme name="Office">
+    <a:fontScheme name="Office Theme">
       <a:majorFont>
         <a:latin typeface="Calibri Light" panose="020F0302020204030204"/>
         <a:ea typeface=""/>
         <a:cs typeface=""/>
-        <a:font script="Jpan" typeface="ＭＳ Ｐゴシック"/>
+        <a:font script="Jpan" typeface="游ゴシック Light"/>
         <a:font script="Hang" typeface="맑은 고딕"/>
-        <a:font script="Hans" typeface="宋体"/>
+        <a:font script="Hans" typeface="等线 Light"/>
         <a:font script="Hant" typeface="新細明體"/>
         <a:font script="Arab" typeface="Times New Roman"/>
         <a:font script="Hebr" typeface="Times New Roman"/>
@@ -6438,9 +6528,9 @@
         <a:latin typeface="Calibri" panose="020F0502020204030204"/>
         <a:ea typeface=""/>
         <a:cs typeface=""/>
-        <a:font script="Jpan" typeface="ＭＳ Ｐゴシック"/>
+        <a:font script="Jpan" typeface="游ゴシック"/>
         <a:font script="Hang" typeface="맑은 고딕"/>
-        <a:font script="Hans" typeface="宋体"/>
+        <a:font script="Hans" typeface="等线"/>
         <a:font script="Hant" typeface="新細明體"/>
         <a:font script="Arab" typeface="Arial"/>
         <a:font script="Hebr" typeface="Arial"/>
@@ -6470,7 +6560,7 @@
         <a:font script="Geor" typeface="Sylfaen"/>
       </a:minorFont>
     </a:fontScheme>
-    <a:fmtScheme name="Office">
+    <a:fmtScheme name="Office Theme">
       <a:fillStyleLst>
         <a:solidFill>
           <a:schemeClr val="phClr"/>

</xml_diff>